<commit_message>
Minor tweaks to April 12 slides.
</commit_message>
<xml_diff>
--- a/Slides/041217.pptx
+++ b/Slides/041217.pptx
@@ -748,7 +748,7 @@
               <ma14:placeholderFlag xmlns:ma14="http://schemas.microsoft.com/office/mac/drawingml/2011/main" val="1"/>
             </a:ext>
             <a:ext uri="{909E8E84-426E-40dd-AFC4-6F175D3DCCD1}">
-              <a14:hiddenFill xmlns="" xmlns:a14="http://schemas.microsoft.com/office/drawing/2010/main">
+              <a14:hiddenFill xmlns:a14="http://schemas.microsoft.com/office/drawing/2010/main" xmlns="">
                 <a:solidFill>
                   <a:srgbClr val="FFFFFF"/>
                 </a:solidFill>
@@ -923,14 +923,14 @@
           <a:ln/>
           <a:extLst>
             <a:ext uri="{909E8E84-426E-40dd-AFC4-6F175D3DCCD1}">
-              <a14:hiddenFill xmlns="" xmlns:a14="http://schemas.microsoft.com/office/drawing/2010/main">
+              <a14:hiddenFill xmlns:a14="http://schemas.microsoft.com/office/drawing/2010/main" xmlns="">
                 <a:solidFill>
                   <a:srgbClr val="FFFFFF"/>
                 </a:solidFill>
               </a14:hiddenFill>
             </a:ext>
             <a:ext uri="{91240B29-F687-4f45-9708-019B960494DF}">
-              <a14:hiddenLine xmlns="" xmlns:a14="http://schemas.microsoft.com/office/drawing/2010/main" w="9525">
+              <a14:hiddenLine xmlns:a14="http://schemas.microsoft.com/office/drawing/2010/main" xmlns="" w="9525">
                 <a:solidFill>
                   <a:srgbClr val="000000"/>
                 </a:solidFill>
@@ -1101,14 +1101,14 @@
               <ma14:placeholderFlag xmlns:ma14="http://schemas.microsoft.com/office/mac/drawingml/2011/main" val="1"/>
             </a:ext>
             <a:ext uri="{909E8E84-426E-40dd-AFC4-6F175D3DCCD1}">
-              <a14:hiddenFill xmlns="" xmlns:a14="http://schemas.microsoft.com/office/drawing/2010/main">
+              <a14:hiddenFill xmlns:a14="http://schemas.microsoft.com/office/drawing/2010/main" xmlns="">
                 <a:solidFill>
                   <a:srgbClr val="FFFFFF"/>
                 </a:solidFill>
               </a14:hiddenFill>
             </a:ext>
             <a:ext uri="{91240B29-F687-4f45-9708-019B960494DF}">
-              <a14:hiddenLine xmlns="" xmlns:a14="http://schemas.microsoft.com/office/drawing/2010/main" w="9525">
+              <a14:hiddenLine xmlns:a14="http://schemas.microsoft.com/office/drawing/2010/main" xmlns="" w="9525">
                 <a:solidFill>
                   <a:srgbClr val="000000"/>
                 </a:solidFill>
@@ -1175,14 +1175,14 @@
           <a:ln/>
           <a:extLst>
             <a:ext uri="{909E8E84-426E-40dd-AFC4-6F175D3DCCD1}">
-              <a14:hiddenFill xmlns="" xmlns:a14="http://schemas.microsoft.com/office/drawing/2010/main">
+              <a14:hiddenFill xmlns:a14="http://schemas.microsoft.com/office/drawing/2010/main" xmlns="">
                 <a:solidFill>
                   <a:srgbClr val="FFFFFF"/>
                 </a:solidFill>
               </a14:hiddenFill>
             </a:ext>
             <a:ext uri="{91240B29-F687-4f45-9708-019B960494DF}">
-              <a14:hiddenLine xmlns="" xmlns:a14="http://schemas.microsoft.com/office/drawing/2010/main" w="9525">
+              <a14:hiddenLine xmlns:a14="http://schemas.microsoft.com/office/drawing/2010/main" xmlns="" w="9525">
                 <a:solidFill>
                   <a:srgbClr val="000000"/>
                 </a:solidFill>
@@ -1416,14 +1416,14 @@
           <a:ln/>
           <a:extLst>
             <a:ext uri="{909E8E84-426E-40dd-AFC4-6F175D3DCCD1}">
-              <a14:hiddenFill xmlns="" xmlns:a14="http://schemas.microsoft.com/office/drawing/2010/main">
+              <a14:hiddenFill xmlns:a14="http://schemas.microsoft.com/office/drawing/2010/main" xmlns="">
                 <a:solidFill>
                   <a:srgbClr val="FFFFFF"/>
                 </a:solidFill>
               </a14:hiddenFill>
             </a:ext>
             <a:ext uri="{91240B29-F687-4f45-9708-019B960494DF}">
-              <a14:hiddenLine xmlns="" xmlns:a14="http://schemas.microsoft.com/office/drawing/2010/main" w="9525">
+              <a14:hiddenLine xmlns:a14="http://schemas.microsoft.com/office/drawing/2010/main" xmlns="" w="9525">
                 <a:solidFill>
                   <a:srgbClr val="000000"/>
                 </a:solidFill>
@@ -1657,14 +1657,14 @@
           <a:ln/>
           <a:extLst>
             <a:ext uri="{909E8E84-426E-40dd-AFC4-6F175D3DCCD1}">
-              <a14:hiddenFill xmlns="" xmlns:a14="http://schemas.microsoft.com/office/drawing/2010/main">
+              <a14:hiddenFill xmlns:a14="http://schemas.microsoft.com/office/drawing/2010/main" xmlns="">
                 <a:solidFill>
                   <a:srgbClr val="FFFFFF"/>
                 </a:solidFill>
               </a14:hiddenFill>
             </a:ext>
             <a:ext uri="{91240B29-F687-4f45-9708-019B960494DF}">
-              <a14:hiddenLine xmlns="" xmlns:a14="http://schemas.microsoft.com/office/drawing/2010/main" w="9525">
+              <a14:hiddenLine xmlns:a14="http://schemas.microsoft.com/office/drawing/2010/main" xmlns="" w="9525">
                 <a:solidFill>
                   <a:srgbClr val="000000"/>
                 </a:solidFill>
@@ -1898,14 +1898,14 @@
           <a:ln/>
           <a:extLst>
             <a:ext uri="{909E8E84-426E-40dd-AFC4-6F175D3DCCD1}">
-              <a14:hiddenFill xmlns="" xmlns:a14="http://schemas.microsoft.com/office/drawing/2010/main">
+              <a14:hiddenFill xmlns:a14="http://schemas.microsoft.com/office/drawing/2010/main" xmlns="">
                 <a:solidFill>
                   <a:srgbClr val="FFFFFF"/>
                 </a:solidFill>
               </a14:hiddenFill>
             </a:ext>
             <a:ext uri="{91240B29-F687-4f45-9708-019B960494DF}">
-              <a14:hiddenLine xmlns="" xmlns:a14="http://schemas.microsoft.com/office/drawing/2010/main" w="9525">
+              <a14:hiddenLine xmlns:a14="http://schemas.microsoft.com/office/drawing/2010/main" xmlns="" w="9525">
                 <a:solidFill>
                   <a:srgbClr val="000000"/>
                 </a:solidFill>
@@ -2081,14 +2081,14 @@
               <ma14:placeholderFlag xmlns:ma14="http://schemas.microsoft.com/office/mac/drawingml/2011/main" val="1"/>
             </a:ext>
             <a:ext uri="{909E8E84-426E-40dd-AFC4-6F175D3DCCD1}">
-              <a14:hiddenFill xmlns="" xmlns:a14="http://schemas.microsoft.com/office/drawing/2010/main">
+              <a14:hiddenFill xmlns:a14="http://schemas.microsoft.com/office/drawing/2010/main" xmlns="">
                 <a:solidFill>
                   <a:srgbClr val="FFFFFF"/>
                 </a:solidFill>
               </a14:hiddenFill>
             </a:ext>
             <a:ext uri="{91240B29-F687-4f45-9708-019B960494DF}">
-              <a14:hiddenLine xmlns="" xmlns:a14="http://schemas.microsoft.com/office/drawing/2010/main" w="9525">
+              <a14:hiddenLine xmlns:a14="http://schemas.microsoft.com/office/drawing/2010/main" xmlns="" w="9525">
                 <a:solidFill>
                   <a:srgbClr val="000000"/>
                 </a:solidFill>
@@ -2240,14 +2240,14 @@
           <a:ln/>
           <a:extLst>
             <a:ext uri="{909E8E84-426E-40dd-AFC4-6F175D3DCCD1}">
-              <a14:hiddenFill xmlns:a14="http://schemas.microsoft.com/office/drawing/2010/main" xmlns="">
+              <a14:hiddenFill xmlns="" xmlns:a14="http://schemas.microsoft.com/office/drawing/2010/main">
                 <a:solidFill>
                   <a:srgbClr val="FFFFFF"/>
                 </a:solidFill>
               </a14:hiddenFill>
             </a:ext>
             <a:ext uri="{91240B29-F687-4f45-9708-019B960494DF}">
-              <a14:hiddenLine xmlns:a14="http://schemas.microsoft.com/office/drawing/2010/main" xmlns="" w="9525">
+              <a14:hiddenLine xmlns="" xmlns:a14="http://schemas.microsoft.com/office/drawing/2010/main" w="9525">
                 <a:solidFill>
                   <a:srgbClr val="000000"/>
                 </a:solidFill>
@@ -2489,14 +2489,14 @@
           <a:ln/>
           <a:extLst>
             <a:ext uri="{909E8E84-426E-40dd-AFC4-6F175D3DCCD1}">
-              <a14:hiddenFill xmlns:a14="http://schemas.microsoft.com/office/drawing/2010/main" xmlns="">
+              <a14:hiddenFill xmlns="" xmlns:a14="http://schemas.microsoft.com/office/drawing/2010/main">
                 <a:solidFill>
                   <a:srgbClr val="FFFFFF"/>
                 </a:solidFill>
               </a14:hiddenFill>
             </a:ext>
             <a:ext uri="{91240B29-F687-4f45-9708-019B960494DF}">
-              <a14:hiddenLine xmlns:a14="http://schemas.microsoft.com/office/drawing/2010/main" xmlns="" w="9525">
+              <a14:hiddenLine xmlns="" xmlns:a14="http://schemas.microsoft.com/office/drawing/2010/main" w="9525">
                 <a:solidFill>
                   <a:srgbClr val="000000"/>
                 </a:solidFill>
@@ -2738,14 +2738,14 @@
           <a:ln/>
           <a:extLst>
             <a:ext uri="{909E8E84-426E-40dd-AFC4-6F175D3DCCD1}">
-              <a14:hiddenFill xmlns="" xmlns:a14="http://schemas.microsoft.com/office/drawing/2010/main">
+              <a14:hiddenFill xmlns:a14="http://schemas.microsoft.com/office/drawing/2010/main" xmlns="">
                 <a:solidFill>
                   <a:srgbClr val="FFFFFF"/>
                 </a:solidFill>
               </a14:hiddenFill>
             </a:ext>
             <a:ext uri="{91240B29-F687-4f45-9708-019B960494DF}">
-              <a14:hiddenLine xmlns="" xmlns:a14="http://schemas.microsoft.com/office/drawing/2010/main" w="9525">
+              <a14:hiddenLine xmlns:a14="http://schemas.microsoft.com/office/drawing/2010/main" xmlns="" w="9525">
                 <a:solidFill>
                   <a:srgbClr val="000000"/>
                 </a:solidFill>
@@ -2993,14 +2993,14 @@
           <a:ln/>
           <a:extLst>
             <a:ext uri="{909E8E84-426E-40dd-AFC4-6F175D3DCCD1}">
-              <a14:hiddenFill xmlns="" xmlns:a14="http://schemas.microsoft.com/office/drawing/2010/main">
+              <a14:hiddenFill xmlns:a14="http://schemas.microsoft.com/office/drawing/2010/main" xmlns="">
                 <a:solidFill>
                   <a:srgbClr val="FFFFFF"/>
                 </a:solidFill>
               </a14:hiddenFill>
             </a:ext>
             <a:ext uri="{91240B29-F687-4f45-9708-019B960494DF}">
-              <a14:hiddenLine xmlns="" xmlns:a14="http://schemas.microsoft.com/office/drawing/2010/main" w="9525">
+              <a14:hiddenLine xmlns:a14="http://schemas.microsoft.com/office/drawing/2010/main" xmlns="" w="9525">
                 <a:solidFill>
                   <a:srgbClr val="000000"/>
                 </a:solidFill>
@@ -3234,14 +3234,14 @@
           <a:ln/>
           <a:extLst>
             <a:ext uri="{909E8E84-426E-40dd-AFC4-6F175D3DCCD1}">
-              <a14:hiddenFill xmlns="" xmlns:a14="http://schemas.microsoft.com/office/drawing/2010/main">
+              <a14:hiddenFill xmlns:a14="http://schemas.microsoft.com/office/drawing/2010/main" xmlns="">
                 <a:solidFill>
                   <a:srgbClr val="FFFFFF"/>
                 </a:solidFill>
               </a14:hiddenFill>
             </a:ext>
             <a:ext uri="{91240B29-F687-4f45-9708-019B960494DF}">
-              <a14:hiddenLine xmlns="" xmlns:a14="http://schemas.microsoft.com/office/drawing/2010/main" w="9525">
+              <a14:hiddenLine xmlns:a14="http://schemas.microsoft.com/office/drawing/2010/main" xmlns="" w="9525">
                 <a:solidFill>
                   <a:srgbClr val="000000"/>
                 </a:solidFill>
@@ -3475,14 +3475,14 @@
           <a:ln/>
           <a:extLst>
             <a:ext uri="{909E8E84-426E-40dd-AFC4-6F175D3DCCD1}">
-              <a14:hiddenFill xmlns="" xmlns:a14="http://schemas.microsoft.com/office/drawing/2010/main">
+              <a14:hiddenFill xmlns:a14="http://schemas.microsoft.com/office/drawing/2010/main" xmlns="">
                 <a:solidFill>
                   <a:srgbClr val="FFFFFF"/>
                 </a:solidFill>
               </a14:hiddenFill>
             </a:ext>
             <a:ext uri="{91240B29-F687-4f45-9708-019B960494DF}">
-              <a14:hiddenLine xmlns="" xmlns:a14="http://schemas.microsoft.com/office/drawing/2010/main" w="9525">
+              <a14:hiddenLine xmlns:a14="http://schemas.microsoft.com/office/drawing/2010/main" xmlns="" w="9525">
                 <a:solidFill>
                   <a:srgbClr val="000000"/>
                 </a:solidFill>
@@ -3716,14 +3716,14 @@
           <a:ln/>
           <a:extLst>
             <a:ext uri="{909E8E84-426E-40dd-AFC4-6F175D3DCCD1}">
-              <a14:hiddenFill xmlns="" xmlns:a14="http://schemas.microsoft.com/office/drawing/2010/main">
+              <a14:hiddenFill xmlns:a14="http://schemas.microsoft.com/office/drawing/2010/main" xmlns="">
                 <a:solidFill>
                   <a:srgbClr val="FFFFFF"/>
                 </a:solidFill>
               </a14:hiddenFill>
             </a:ext>
             <a:ext uri="{91240B29-F687-4f45-9708-019B960494DF}">
-              <a14:hiddenLine xmlns="" xmlns:a14="http://schemas.microsoft.com/office/drawing/2010/main" w="9525">
+              <a14:hiddenLine xmlns:a14="http://schemas.microsoft.com/office/drawing/2010/main" xmlns="" w="9525">
                 <a:solidFill>
                   <a:srgbClr val="000000"/>
                 </a:solidFill>
@@ -6884,14 +6884,14 @@
               <ma14:placeholderFlag xmlns:ma14="http://schemas.microsoft.com/office/mac/drawingml/2011/main" val="1"/>
             </a:ext>
             <a:ext uri="{909E8E84-426E-40dd-AFC4-6F175D3DCCD1}">
-              <a14:hiddenFill xmlns="" xmlns:a14="http://schemas.microsoft.com/office/drawing/2010/main">
+              <a14:hiddenFill xmlns:a14="http://schemas.microsoft.com/office/drawing/2010/main" xmlns="">
                 <a:solidFill>
                   <a:srgbClr val="FFFFFF"/>
                 </a:solidFill>
               </a14:hiddenFill>
             </a:ext>
             <a:ext uri="{91240B29-F687-4f45-9708-019B960494DF}">
-              <a14:hiddenLine xmlns="" xmlns:a14="http://schemas.microsoft.com/office/drawing/2010/main" w="9525">
+              <a14:hiddenLine xmlns:a14="http://schemas.microsoft.com/office/drawing/2010/main" xmlns="" w="9525">
                 <a:solidFill>
                   <a:srgbClr val="000000"/>
                 </a:solidFill>
@@ -8005,7 +8005,7 @@
           </a:ln>
           <a:extLst>
             <a:ext uri="{909E8E84-426E-40dd-AFC4-6F175D3DCCD1}">
-              <a14:hiddenFill xmlns:a14="http://schemas.microsoft.com/office/drawing/2010/main" xmlns="">
+              <a14:hiddenFill xmlns="" xmlns:a14="http://schemas.microsoft.com/office/drawing/2010/main">
                 <a:noFill/>
               </a14:hiddenFill>
             </a:ext>
@@ -8045,14 +8045,14 @@
           </a:ln>
           <a:extLst>
             <a:ext uri="{909E8E84-426E-40dd-AFC4-6F175D3DCCD1}">
-              <a14:hiddenFill xmlns:a14="http://schemas.microsoft.com/office/drawing/2010/main" xmlns="">
+              <a14:hiddenFill xmlns="" xmlns:a14="http://schemas.microsoft.com/office/drawing/2010/main">
                 <a:solidFill>
                   <a:srgbClr val="FFFFFF"/>
                 </a:solidFill>
               </a14:hiddenFill>
             </a:ext>
             <a:ext uri="{91240B29-F687-4f45-9708-019B960494DF}">
-              <a14:hiddenLine xmlns:a14="http://schemas.microsoft.com/office/drawing/2010/main" xmlns="" w="25400">
+              <a14:hiddenLine xmlns="" xmlns:a14="http://schemas.microsoft.com/office/drawing/2010/main" w="25400">
                 <a:solidFill>
                   <a:srgbClr val="000000"/>
                 </a:solidFill>
@@ -8219,14 +8219,14 @@
           </a:ln>
           <a:extLst>
             <a:ext uri="{909E8E84-426E-40dd-AFC4-6F175D3DCCD1}">
-              <a14:hiddenFill xmlns:a14="http://schemas.microsoft.com/office/drawing/2010/main" xmlns="">
+              <a14:hiddenFill xmlns="" xmlns:a14="http://schemas.microsoft.com/office/drawing/2010/main">
                 <a:solidFill>
                   <a:srgbClr val="FFFFFF"/>
                 </a:solidFill>
               </a14:hiddenFill>
             </a:ext>
             <a:ext uri="{91240B29-F687-4f45-9708-019B960494DF}">
-              <a14:hiddenLine xmlns:a14="http://schemas.microsoft.com/office/drawing/2010/main" xmlns="" w="25400">
+              <a14:hiddenLine xmlns="" xmlns:a14="http://schemas.microsoft.com/office/drawing/2010/main" w="25400">
                 <a:solidFill>
                   <a:srgbClr val="000000"/>
                 </a:solidFill>
@@ -8398,7 +8398,7 @@
           </a:ln>
           <a:extLst>
             <a:ext uri="{909E8E84-426E-40dd-AFC4-6F175D3DCCD1}">
-              <a14:hiddenFill xmlns:a14="http://schemas.microsoft.com/office/drawing/2010/main" xmlns="">
+              <a14:hiddenFill xmlns="" xmlns:a14="http://schemas.microsoft.com/office/drawing/2010/main">
                 <a:noFill/>
               </a14:hiddenFill>
             </a:ext>
@@ -8438,14 +8438,14 @@
           </a:ln>
           <a:extLst>
             <a:ext uri="{909E8E84-426E-40dd-AFC4-6F175D3DCCD1}">
-              <a14:hiddenFill xmlns:a14="http://schemas.microsoft.com/office/drawing/2010/main" xmlns="">
+              <a14:hiddenFill xmlns="" xmlns:a14="http://schemas.microsoft.com/office/drawing/2010/main">
                 <a:solidFill>
                   <a:srgbClr val="FFFFFF"/>
                 </a:solidFill>
               </a14:hiddenFill>
             </a:ext>
             <a:ext uri="{91240B29-F687-4f45-9708-019B960494DF}">
-              <a14:hiddenLine xmlns:a14="http://schemas.microsoft.com/office/drawing/2010/main" xmlns="" w="12700">
+              <a14:hiddenLine xmlns="" xmlns:a14="http://schemas.microsoft.com/office/drawing/2010/main" w="12700">
                 <a:solidFill>
                   <a:srgbClr val="000000"/>
                 </a:solidFill>
@@ -8612,14 +8612,14 @@
           </a:ln>
           <a:extLst>
             <a:ext uri="{909E8E84-426E-40dd-AFC4-6F175D3DCCD1}">
-              <a14:hiddenFill xmlns:a14="http://schemas.microsoft.com/office/drawing/2010/main" xmlns="">
+              <a14:hiddenFill xmlns="" xmlns:a14="http://schemas.microsoft.com/office/drawing/2010/main">
                 <a:solidFill>
                   <a:srgbClr val="FFFFFF"/>
                 </a:solidFill>
               </a14:hiddenFill>
             </a:ext>
             <a:ext uri="{91240B29-F687-4f45-9708-019B960494DF}">
-              <a14:hiddenLine xmlns:a14="http://schemas.microsoft.com/office/drawing/2010/main" xmlns="" w="12700">
+              <a14:hiddenLine xmlns="" xmlns:a14="http://schemas.microsoft.com/office/drawing/2010/main" w="12700">
                 <a:solidFill>
                   <a:srgbClr val="000000"/>
                 </a:solidFill>
@@ -8807,7 +8807,7 @@
             </a:ln>
             <a:extLst>
               <a:ext uri="{909E8E84-426E-40dd-AFC4-6F175D3DCCD1}">
-                <a14:hiddenFill xmlns:a14="http://schemas.microsoft.com/office/drawing/2010/main" xmlns="">
+                <a14:hiddenFill xmlns="" xmlns:a14="http://schemas.microsoft.com/office/drawing/2010/main">
                   <a:noFill/>
                 </a14:hiddenFill>
               </a:ext>
@@ -8847,14 +8847,14 @@
             </a:ln>
             <a:extLst>
               <a:ext uri="{909E8E84-426E-40dd-AFC4-6F175D3DCCD1}">
-                <a14:hiddenFill xmlns:a14="http://schemas.microsoft.com/office/drawing/2010/main" xmlns="">
+                <a14:hiddenFill xmlns="" xmlns:a14="http://schemas.microsoft.com/office/drawing/2010/main">
                   <a:solidFill>
                     <a:srgbClr val="FFFFFF"/>
                   </a:solidFill>
                 </a14:hiddenFill>
               </a:ext>
               <a:ext uri="{91240B29-F687-4f45-9708-019B960494DF}">
-                <a14:hiddenLine xmlns:a14="http://schemas.microsoft.com/office/drawing/2010/main" xmlns="" w="25400">
+                <a14:hiddenLine xmlns="" xmlns:a14="http://schemas.microsoft.com/office/drawing/2010/main" w="25400">
                   <a:solidFill>
                     <a:srgbClr val="000000"/>
                   </a:solidFill>
@@ -9076,7 +9076,7 @@
             </a:ln>
             <a:extLst>
               <a:ext uri="{909E8E84-426E-40dd-AFC4-6F175D3DCCD1}">
-                <a14:hiddenFill xmlns:a14="http://schemas.microsoft.com/office/drawing/2010/main" xmlns="">
+                <a14:hiddenFill xmlns="" xmlns:a14="http://schemas.microsoft.com/office/drawing/2010/main">
                   <a:noFill/>
                 </a14:hiddenFill>
               </a:ext>
@@ -9116,14 +9116,14 @@
             </a:ln>
             <a:extLst>
               <a:ext uri="{909E8E84-426E-40dd-AFC4-6F175D3DCCD1}">
-                <a14:hiddenFill xmlns:a14="http://schemas.microsoft.com/office/drawing/2010/main" xmlns="">
+                <a14:hiddenFill xmlns="" xmlns:a14="http://schemas.microsoft.com/office/drawing/2010/main">
                   <a:solidFill>
                     <a:srgbClr val="FFFFFF"/>
                   </a:solidFill>
                 </a14:hiddenFill>
               </a:ext>
               <a:ext uri="{91240B29-F687-4f45-9708-019B960494DF}">
-                <a14:hiddenLine xmlns:a14="http://schemas.microsoft.com/office/drawing/2010/main" xmlns="" w="25400">
+                <a14:hiddenLine xmlns="" xmlns:a14="http://schemas.microsoft.com/office/drawing/2010/main" w="25400">
                   <a:solidFill>
                     <a:srgbClr val="000000"/>
                   </a:solidFill>
@@ -9354,7 +9354,7 @@
             </a:ln>
             <a:extLst>
               <a:ext uri="{909E8E84-426E-40dd-AFC4-6F175D3DCCD1}">
-                <a14:hiddenFill xmlns:a14="http://schemas.microsoft.com/office/drawing/2010/main" xmlns="">
+                <a14:hiddenFill xmlns="" xmlns:a14="http://schemas.microsoft.com/office/drawing/2010/main">
                   <a:noFill/>
                 </a14:hiddenFill>
               </a:ext>
@@ -9394,14 +9394,14 @@
             </a:ln>
             <a:extLst>
               <a:ext uri="{909E8E84-426E-40dd-AFC4-6F175D3DCCD1}">
-                <a14:hiddenFill xmlns:a14="http://schemas.microsoft.com/office/drawing/2010/main" xmlns="">
+                <a14:hiddenFill xmlns="" xmlns:a14="http://schemas.microsoft.com/office/drawing/2010/main">
                   <a:solidFill>
                     <a:srgbClr val="FFFFFF"/>
                   </a:solidFill>
                 </a14:hiddenFill>
               </a:ext>
               <a:ext uri="{91240B29-F687-4f45-9708-019B960494DF}">
-                <a14:hiddenLine xmlns:a14="http://schemas.microsoft.com/office/drawing/2010/main" xmlns="" w="25400">
+                <a14:hiddenLine xmlns="" xmlns:a14="http://schemas.microsoft.com/office/drawing/2010/main" w="25400">
                   <a:solidFill>
                     <a:srgbClr val="000000"/>
                   </a:solidFill>
@@ -9616,7 +9616,7 @@
           </a:ln>
           <a:extLst>
             <a:ext uri="{909E8E84-426E-40dd-AFC4-6F175D3DCCD1}">
-              <a14:hiddenFill xmlns:a14="http://schemas.microsoft.com/office/drawing/2010/main" xmlns="">
+              <a14:hiddenFill xmlns="" xmlns:a14="http://schemas.microsoft.com/office/drawing/2010/main">
                 <a:noFill/>
               </a14:hiddenFill>
             </a:ext>
@@ -9656,14 +9656,14 @@
           </a:ln>
           <a:extLst>
             <a:ext uri="{909E8E84-426E-40dd-AFC4-6F175D3DCCD1}">
-              <a14:hiddenFill xmlns:a14="http://schemas.microsoft.com/office/drawing/2010/main" xmlns="">
+              <a14:hiddenFill xmlns="" xmlns:a14="http://schemas.microsoft.com/office/drawing/2010/main">
                 <a:solidFill>
                   <a:srgbClr val="FFFFFF"/>
                 </a:solidFill>
               </a14:hiddenFill>
             </a:ext>
             <a:ext uri="{91240B29-F687-4f45-9708-019B960494DF}">
-              <a14:hiddenLine xmlns:a14="http://schemas.microsoft.com/office/drawing/2010/main" xmlns="" w="25400">
+              <a14:hiddenLine xmlns="" xmlns:a14="http://schemas.microsoft.com/office/drawing/2010/main" w="25400">
                 <a:solidFill>
                   <a:srgbClr val="000000"/>
                 </a:solidFill>
@@ -9836,14 +9836,14 @@
           </a:ln>
           <a:extLst>
             <a:ext uri="{909E8E84-426E-40dd-AFC4-6F175D3DCCD1}">
-              <a14:hiddenFill xmlns:a14="http://schemas.microsoft.com/office/drawing/2010/main" xmlns="">
+              <a14:hiddenFill xmlns="" xmlns:a14="http://schemas.microsoft.com/office/drawing/2010/main">
                 <a:solidFill>
                   <a:srgbClr val="FFFFFF"/>
                 </a:solidFill>
               </a14:hiddenFill>
             </a:ext>
             <a:ext uri="{91240B29-F687-4f45-9708-019B960494DF}">
-              <a14:hiddenLine xmlns:a14="http://schemas.microsoft.com/office/drawing/2010/main" xmlns="" w="12700">
+              <a14:hiddenLine xmlns="" xmlns:a14="http://schemas.microsoft.com/office/drawing/2010/main" w="12700">
                 <a:solidFill>
                   <a:srgbClr val="000000"/>
                 </a:solidFill>
@@ -10495,7 +10495,7 @@
           </a:ln>
           <a:extLst>
             <a:ext uri="{909E8E84-426E-40dd-AFC4-6F175D3DCCD1}">
-              <a14:hiddenFill xmlns:a14="http://schemas.microsoft.com/office/drawing/2010/main" xmlns="">
+              <a14:hiddenFill xmlns="" xmlns:a14="http://schemas.microsoft.com/office/drawing/2010/main">
                 <a:noFill/>
               </a14:hiddenFill>
             </a:ext>
@@ -10535,14 +10535,14 @@
           </a:ln>
           <a:extLst>
             <a:ext uri="{909E8E84-426E-40dd-AFC4-6F175D3DCCD1}">
-              <a14:hiddenFill xmlns:a14="http://schemas.microsoft.com/office/drawing/2010/main" xmlns="">
+              <a14:hiddenFill xmlns="" xmlns:a14="http://schemas.microsoft.com/office/drawing/2010/main">
                 <a:solidFill>
                   <a:srgbClr val="FFFFFF"/>
                 </a:solidFill>
               </a14:hiddenFill>
             </a:ext>
             <a:ext uri="{91240B29-F687-4f45-9708-019B960494DF}">
-              <a14:hiddenLine xmlns:a14="http://schemas.microsoft.com/office/drawing/2010/main" xmlns="" w="25400">
+              <a14:hiddenLine xmlns="" xmlns:a14="http://schemas.microsoft.com/office/drawing/2010/main" w="25400">
                 <a:solidFill>
                   <a:srgbClr val="000000"/>
                 </a:solidFill>
@@ -10709,14 +10709,14 @@
           </a:ln>
           <a:extLst>
             <a:ext uri="{909E8E84-426E-40dd-AFC4-6F175D3DCCD1}">
-              <a14:hiddenFill xmlns:a14="http://schemas.microsoft.com/office/drawing/2010/main" xmlns="">
+              <a14:hiddenFill xmlns="" xmlns:a14="http://schemas.microsoft.com/office/drawing/2010/main">
                 <a:solidFill>
                   <a:srgbClr val="FFFFFF"/>
                 </a:solidFill>
               </a14:hiddenFill>
             </a:ext>
             <a:ext uri="{91240B29-F687-4f45-9708-019B960494DF}">
-              <a14:hiddenLine xmlns:a14="http://schemas.microsoft.com/office/drawing/2010/main" xmlns="" w="25400">
+              <a14:hiddenLine xmlns="" xmlns:a14="http://schemas.microsoft.com/office/drawing/2010/main" w="25400">
                 <a:solidFill>
                   <a:srgbClr val="000000"/>
                 </a:solidFill>
@@ -10888,7 +10888,7 @@
           </a:ln>
           <a:extLst>
             <a:ext uri="{909E8E84-426E-40dd-AFC4-6F175D3DCCD1}">
-              <a14:hiddenFill xmlns:a14="http://schemas.microsoft.com/office/drawing/2010/main" xmlns="">
+              <a14:hiddenFill xmlns="" xmlns:a14="http://schemas.microsoft.com/office/drawing/2010/main">
                 <a:noFill/>
               </a14:hiddenFill>
             </a:ext>
@@ -10928,14 +10928,14 @@
           </a:ln>
           <a:extLst>
             <a:ext uri="{909E8E84-426E-40dd-AFC4-6F175D3DCCD1}">
-              <a14:hiddenFill xmlns:a14="http://schemas.microsoft.com/office/drawing/2010/main" xmlns="">
+              <a14:hiddenFill xmlns="" xmlns:a14="http://schemas.microsoft.com/office/drawing/2010/main">
                 <a:solidFill>
                   <a:srgbClr val="FFFFFF"/>
                 </a:solidFill>
               </a14:hiddenFill>
             </a:ext>
             <a:ext uri="{91240B29-F687-4f45-9708-019B960494DF}">
-              <a14:hiddenLine xmlns:a14="http://schemas.microsoft.com/office/drawing/2010/main" xmlns="" w="12700">
+              <a14:hiddenLine xmlns="" xmlns:a14="http://schemas.microsoft.com/office/drawing/2010/main" w="12700">
                 <a:solidFill>
                   <a:srgbClr val="000000"/>
                 </a:solidFill>
@@ -11102,14 +11102,14 @@
           </a:ln>
           <a:extLst>
             <a:ext uri="{909E8E84-426E-40dd-AFC4-6F175D3DCCD1}">
-              <a14:hiddenFill xmlns:a14="http://schemas.microsoft.com/office/drawing/2010/main" xmlns="">
+              <a14:hiddenFill xmlns="" xmlns:a14="http://schemas.microsoft.com/office/drawing/2010/main">
                 <a:solidFill>
                   <a:srgbClr val="FFFFFF"/>
                 </a:solidFill>
               </a14:hiddenFill>
             </a:ext>
             <a:ext uri="{91240B29-F687-4f45-9708-019B960494DF}">
-              <a14:hiddenLine xmlns:a14="http://schemas.microsoft.com/office/drawing/2010/main" xmlns="" w="12700">
+              <a14:hiddenLine xmlns="" xmlns:a14="http://schemas.microsoft.com/office/drawing/2010/main" w="12700">
                 <a:solidFill>
                   <a:srgbClr val="000000"/>
                 </a:solidFill>
@@ -11297,7 +11297,7 @@
             </a:ln>
             <a:extLst>
               <a:ext uri="{909E8E84-426E-40dd-AFC4-6F175D3DCCD1}">
-                <a14:hiddenFill xmlns:a14="http://schemas.microsoft.com/office/drawing/2010/main" xmlns="">
+                <a14:hiddenFill xmlns="" xmlns:a14="http://schemas.microsoft.com/office/drawing/2010/main">
                   <a:noFill/>
                 </a14:hiddenFill>
               </a:ext>
@@ -11337,14 +11337,14 @@
             </a:ln>
             <a:extLst>
               <a:ext uri="{909E8E84-426E-40dd-AFC4-6F175D3DCCD1}">
-                <a14:hiddenFill xmlns:a14="http://schemas.microsoft.com/office/drawing/2010/main" xmlns="">
+                <a14:hiddenFill xmlns="" xmlns:a14="http://schemas.microsoft.com/office/drawing/2010/main">
                   <a:solidFill>
                     <a:srgbClr val="FFFFFF"/>
                   </a:solidFill>
                 </a14:hiddenFill>
               </a:ext>
               <a:ext uri="{91240B29-F687-4f45-9708-019B960494DF}">
-                <a14:hiddenLine xmlns:a14="http://schemas.microsoft.com/office/drawing/2010/main" xmlns="" w="25400">
+                <a14:hiddenLine xmlns="" xmlns:a14="http://schemas.microsoft.com/office/drawing/2010/main" w="25400">
                   <a:solidFill>
                     <a:srgbClr val="000000"/>
                   </a:solidFill>
@@ -11566,7 +11566,7 @@
             </a:ln>
             <a:extLst>
               <a:ext uri="{909E8E84-426E-40dd-AFC4-6F175D3DCCD1}">
-                <a14:hiddenFill xmlns:a14="http://schemas.microsoft.com/office/drawing/2010/main" xmlns="">
+                <a14:hiddenFill xmlns="" xmlns:a14="http://schemas.microsoft.com/office/drawing/2010/main">
                   <a:noFill/>
                 </a14:hiddenFill>
               </a:ext>
@@ -11606,14 +11606,14 @@
             </a:ln>
             <a:extLst>
               <a:ext uri="{909E8E84-426E-40dd-AFC4-6F175D3DCCD1}">
-                <a14:hiddenFill xmlns:a14="http://schemas.microsoft.com/office/drawing/2010/main" xmlns="">
+                <a14:hiddenFill xmlns="" xmlns:a14="http://schemas.microsoft.com/office/drawing/2010/main">
                   <a:solidFill>
                     <a:srgbClr val="FFFFFF"/>
                   </a:solidFill>
                 </a14:hiddenFill>
               </a:ext>
               <a:ext uri="{91240B29-F687-4f45-9708-019B960494DF}">
-                <a14:hiddenLine xmlns:a14="http://schemas.microsoft.com/office/drawing/2010/main" xmlns="" w="25400">
+                <a14:hiddenLine xmlns="" xmlns:a14="http://schemas.microsoft.com/office/drawing/2010/main" w="25400">
                   <a:solidFill>
                     <a:srgbClr val="000000"/>
                   </a:solidFill>
@@ -11844,7 +11844,7 @@
             </a:ln>
             <a:extLst>
               <a:ext uri="{909E8E84-426E-40dd-AFC4-6F175D3DCCD1}">
-                <a14:hiddenFill xmlns:a14="http://schemas.microsoft.com/office/drawing/2010/main" xmlns="">
+                <a14:hiddenFill xmlns="" xmlns:a14="http://schemas.microsoft.com/office/drawing/2010/main">
                   <a:noFill/>
                 </a14:hiddenFill>
               </a:ext>
@@ -11884,14 +11884,14 @@
             </a:ln>
             <a:extLst>
               <a:ext uri="{909E8E84-426E-40dd-AFC4-6F175D3DCCD1}">
-                <a14:hiddenFill xmlns:a14="http://schemas.microsoft.com/office/drawing/2010/main" xmlns="">
+                <a14:hiddenFill xmlns="" xmlns:a14="http://schemas.microsoft.com/office/drawing/2010/main">
                   <a:solidFill>
                     <a:srgbClr val="FFFFFF"/>
                   </a:solidFill>
                 </a14:hiddenFill>
               </a:ext>
               <a:ext uri="{91240B29-F687-4f45-9708-019B960494DF}">
-                <a14:hiddenLine xmlns:a14="http://schemas.microsoft.com/office/drawing/2010/main" xmlns="" w="25400">
+                <a14:hiddenLine xmlns="" xmlns:a14="http://schemas.microsoft.com/office/drawing/2010/main" w="25400">
                   <a:solidFill>
                     <a:srgbClr val="000000"/>
                   </a:solidFill>
@@ -12106,7 +12106,7 @@
           </a:ln>
           <a:extLst>
             <a:ext uri="{909E8E84-426E-40dd-AFC4-6F175D3DCCD1}">
-              <a14:hiddenFill xmlns:a14="http://schemas.microsoft.com/office/drawing/2010/main" xmlns="">
+              <a14:hiddenFill xmlns="" xmlns:a14="http://schemas.microsoft.com/office/drawing/2010/main">
                 <a:noFill/>
               </a14:hiddenFill>
             </a:ext>
@@ -12146,14 +12146,14 @@
           </a:ln>
           <a:extLst>
             <a:ext uri="{909E8E84-426E-40dd-AFC4-6F175D3DCCD1}">
-              <a14:hiddenFill xmlns:a14="http://schemas.microsoft.com/office/drawing/2010/main" xmlns="">
+              <a14:hiddenFill xmlns="" xmlns:a14="http://schemas.microsoft.com/office/drawing/2010/main">
                 <a:solidFill>
                   <a:srgbClr val="FFFFFF"/>
                 </a:solidFill>
               </a14:hiddenFill>
             </a:ext>
             <a:ext uri="{91240B29-F687-4f45-9708-019B960494DF}">
-              <a14:hiddenLine xmlns:a14="http://schemas.microsoft.com/office/drawing/2010/main" xmlns="" w="25400">
+              <a14:hiddenLine xmlns="" xmlns:a14="http://schemas.microsoft.com/office/drawing/2010/main" w="25400">
                 <a:solidFill>
                   <a:srgbClr val="000000"/>
                 </a:solidFill>
@@ -12326,14 +12326,14 @@
           </a:ln>
           <a:extLst>
             <a:ext uri="{909E8E84-426E-40dd-AFC4-6F175D3DCCD1}">
-              <a14:hiddenFill xmlns:a14="http://schemas.microsoft.com/office/drawing/2010/main" xmlns="">
+              <a14:hiddenFill xmlns="" xmlns:a14="http://schemas.microsoft.com/office/drawing/2010/main">
                 <a:solidFill>
                   <a:srgbClr val="FFFFFF"/>
                 </a:solidFill>
               </a14:hiddenFill>
             </a:ext>
             <a:ext uri="{91240B29-F687-4f45-9708-019B960494DF}">
-              <a14:hiddenLine xmlns:a14="http://schemas.microsoft.com/office/drawing/2010/main" xmlns="" w="12700">
+              <a14:hiddenLine xmlns="" xmlns:a14="http://schemas.microsoft.com/office/drawing/2010/main" w="12700">
                 <a:solidFill>
                   <a:srgbClr val="000000"/>
                 </a:solidFill>
@@ -12496,7 +12496,7 @@
         </p:nvGrpSpPr>
         <p:grpSpPr bwMode="auto">
           <a:xfrm>
-            <a:off x="1895663" y="5405311"/>
+            <a:off x="1919309" y="5405311"/>
             <a:ext cx="4938691" cy="617538"/>
             <a:chOff x="1208" y="2731"/>
             <a:chExt cx="3112" cy="389"/>
@@ -12529,7 +12529,7 @@
             </a:ln>
             <a:extLst>
               <a:ext uri="{909E8E84-426E-40dd-AFC4-6F175D3DCCD1}">
-                <a14:hiddenFill xmlns:a14="http://schemas.microsoft.com/office/drawing/2010/main" xmlns="">
+                <a14:hiddenFill xmlns="" xmlns:a14="http://schemas.microsoft.com/office/drawing/2010/main">
                   <a:noFill/>
                 </a14:hiddenFill>
               </a:ext>
@@ -12569,14 +12569,14 @@
             </a:ln>
             <a:extLst>
               <a:ext uri="{909E8E84-426E-40dd-AFC4-6F175D3DCCD1}">
-                <a14:hiddenFill xmlns:a14="http://schemas.microsoft.com/office/drawing/2010/main" xmlns="">
+                <a14:hiddenFill xmlns="" xmlns:a14="http://schemas.microsoft.com/office/drawing/2010/main">
                   <a:solidFill>
                     <a:srgbClr val="FFFFFF"/>
                   </a:solidFill>
                 </a14:hiddenFill>
               </a:ext>
               <a:ext uri="{91240B29-F687-4f45-9708-019B960494DF}">
-                <a14:hiddenLine xmlns:a14="http://schemas.microsoft.com/office/drawing/2010/main" xmlns="" w="25400">
+                <a14:hiddenLine xmlns="" xmlns:a14="http://schemas.microsoft.com/office/drawing/2010/main" w="25400">
                   <a:solidFill>
                     <a:srgbClr val="000000"/>
                   </a:solidFill>
@@ -12786,14 +12786,14 @@
           </a:ln>
           <a:extLst>
             <a:ext uri="{909E8E84-426E-40dd-AFC4-6F175D3DCCD1}">
-              <a14:hiddenFill xmlns:a14="http://schemas.microsoft.com/office/drawing/2010/main" xmlns="">
+              <a14:hiddenFill xmlns="" xmlns:a14="http://schemas.microsoft.com/office/drawing/2010/main">
                 <a:solidFill>
                   <a:srgbClr val="FFFFFF"/>
                 </a:solidFill>
               </a14:hiddenFill>
             </a:ext>
             <a:ext uri="{91240B29-F687-4f45-9708-019B960494DF}">
-              <a14:hiddenLine xmlns:a14="http://schemas.microsoft.com/office/drawing/2010/main" xmlns="" w="12700">
+              <a14:hiddenLine xmlns="" xmlns:a14="http://schemas.microsoft.com/office/drawing/2010/main" w="12700">
                 <a:solidFill>
                   <a:srgbClr val="000000"/>
                 </a:solidFill>
@@ -13930,7 +13930,7 @@
             </a:ln>
             <a:extLst>
               <a:ext uri="{909E8E84-426E-40dd-AFC4-6F175D3DCCD1}">
-                <a14:hiddenFill xmlns:a14="http://schemas.microsoft.com/office/drawing/2010/main" xmlns="">
+                <a14:hiddenFill xmlns="" xmlns:a14="http://schemas.microsoft.com/office/drawing/2010/main">
                   <a:solidFill>
                     <a:srgbClr val="FFFFFF"/>
                   </a:solidFill>
@@ -13971,14 +13971,14 @@
             </a:ln>
             <a:extLst>
               <a:ext uri="{909E8E84-426E-40dd-AFC4-6F175D3DCCD1}">
-                <a14:hiddenFill xmlns:a14="http://schemas.microsoft.com/office/drawing/2010/main" xmlns="">
+                <a14:hiddenFill xmlns="" xmlns:a14="http://schemas.microsoft.com/office/drawing/2010/main">
                   <a:solidFill>
                     <a:srgbClr val="FFFFFF"/>
                   </a:solidFill>
                 </a14:hiddenFill>
               </a:ext>
               <a:ext uri="{91240B29-F687-4f45-9708-019B960494DF}">
-                <a14:hiddenLine xmlns:a14="http://schemas.microsoft.com/office/drawing/2010/main" xmlns="" w="9525">
+                <a14:hiddenLine xmlns="" xmlns:a14="http://schemas.microsoft.com/office/drawing/2010/main" w="9525">
                   <a:solidFill>
                     <a:srgbClr val="000000"/>
                   </a:solidFill>
@@ -14139,7 +14139,7 @@
             </a:ln>
             <a:extLst>
               <a:ext uri="{909E8E84-426E-40dd-AFC4-6F175D3DCCD1}">
-                <a14:hiddenFill xmlns:a14="http://schemas.microsoft.com/office/drawing/2010/main" xmlns="">
+                <a14:hiddenFill xmlns="" xmlns:a14="http://schemas.microsoft.com/office/drawing/2010/main">
                   <a:solidFill>
                     <a:srgbClr val="FFFFFF"/>
                   </a:solidFill>
@@ -14180,14 +14180,14 @@
             </a:ln>
             <a:extLst>
               <a:ext uri="{909E8E84-426E-40dd-AFC4-6F175D3DCCD1}">
-                <a14:hiddenFill xmlns:a14="http://schemas.microsoft.com/office/drawing/2010/main" xmlns="">
+                <a14:hiddenFill xmlns="" xmlns:a14="http://schemas.microsoft.com/office/drawing/2010/main">
                   <a:solidFill>
                     <a:srgbClr val="FFFFFF"/>
                   </a:solidFill>
                 </a14:hiddenFill>
               </a:ext>
               <a:ext uri="{91240B29-F687-4f45-9708-019B960494DF}">
-                <a14:hiddenLine xmlns:a14="http://schemas.microsoft.com/office/drawing/2010/main" xmlns="" w="9525">
+                <a14:hiddenLine xmlns="" xmlns:a14="http://schemas.microsoft.com/office/drawing/2010/main" w="9525">
                   <a:solidFill>
                     <a:srgbClr val="000000"/>
                   </a:solidFill>
@@ -14348,7 +14348,7 @@
             </a:ln>
             <a:extLst>
               <a:ext uri="{909E8E84-426E-40dd-AFC4-6F175D3DCCD1}">
-                <a14:hiddenFill xmlns:a14="http://schemas.microsoft.com/office/drawing/2010/main" xmlns="">
+                <a14:hiddenFill xmlns="" xmlns:a14="http://schemas.microsoft.com/office/drawing/2010/main">
                   <a:solidFill>
                     <a:srgbClr val="FFFFFF"/>
                   </a:solidFill>
@@ -14389,14 +14389,14 @@
             </a:ln>
             <a:extLst>
               <a:ext uri="{909E8E84-426E-40dd-AFC4-6F175D3DCCD1}">
-                <a14:hiddenFill xmlns:a14="http://schemas.microsoft.com/office/drawing/2010/main" xmlns="">
+                <a14:hiddenFill xmlns="" xmlns:a14="http://schemas.microsoft.com/office/drawing/2010/main">
                   <a:solidFill>
                     <a:srgbClr val="FFFFFF"/>
                   </a:solidFill>
                 </a14:hiddenFill>
               </a:ext>
               <a:ext uri="{91240B29-F687-4f45-9708-019B960494DF}">
-                <a14:hiddenLine xmlns:a14="http://schemas.microsoft.com/office/drawing/2010/main" xmlns="" w="9525">
+                <a14:hiddenLine xmlns="" xmlns:a14="http://schemas.microsoft.com/office/drawing/2010/main" w="9525">
                   <a:solidFill>
                     <a:srgbClr val="000000"/>
                   </a:solidFill>
@@ -14552,14 +14552,14 @@
             </a:ln>
             <a:extLst>
               <a:ext uri="{909E8E84-426E-40dd-AFC4-6F175D3DCCD1}">
-                <a14:hiddenFill xmlns:a14="http://schemas.microsoft.com/office/drawing/2010/main" xmlns="">
+                <a14:hiddenFill xmlns="" xmlns:a14="http://schemas.microsoft.com/office/drawing/2010/main">
                   <a:solidFill>
                     <a:srgbClr val="FFFFFF"/>
                   </a:solidFill>
                 </a14:hiddenFill>
               </a:ext>
               <a:ext uri="{91240B29-F687-4f45-9708-019B960494DF}">
-                <a14:hiddenLine xmlns:a14="http://schemas.microsoft.com/office/drawing/2010/main" xmlns="" w="9525">
+                <a14:hiddenLine xmlns="" xmlns:a14="http://schemas.microsoft.com/office/drawing/2010/main" w="9525">
                   <a:solidFill>
                     <a:srgbClr val="000000"/>
                   </a:solidFill>
@@ -14760,7 +14760,7 @@
             </a:ln>
             <a:extLst>
               <a:ext uri="{909E8E84-426E-40dd-AFC4-6F175D3DCCD1}">
-                <a14:hiddenFill xmlns:a14="http://schemas.microsoft.com/office/drawing/2010/main" xmlns="">
+                <a14:hiddenFill xmlns="" xmlns:a14="http://schemas.microsoft.com/office/drawing/2010/main">
                   <a:solidFill>
                     <a:srgbClr val="FFFFFF"/>
                   </a:solidFill>
@@ -14801,14 +14801,14 @@
             </a:ln>
             <a:extLst>
               <a:ext uri="{909E8E84-426E-40dd-AFC4-6F175D3DCCD1}">
-                <a14:hiddenFill xmlns:a14="http://schemas.microsoft.com/office/drawing/2010/main" xmlns="">
+                <a14:hiddenFill xmlns="" xmlns:a14="http://schemas.microsoft.com/office/drawing/2010/main">
                   <a:solidFill>
                     <a:srgbClr val="FFFFFF"/>
                   </a:solidFill>
                 </a14:hiddenFill>
               </a:ext>
               <a:ext uri="{91240B29-F687-4f45-9708-019B960494DF}">
-                <a14:hiddenLine xmlns:a14="http://schemas.microsoft.com/office/drawing/2010/main" xmlns="" w="9525">
+                <a14:hiddenLine xmlns="" xmlns:a14="http://schemas.microsoft.com/office/drawing/2010/main" w="9525">
                   <a:solidFill>
                     <a:srgbClr val="000000"/>
                   </a:solidFill>
@@ -15008,7 +15008,7 @@
             </a:ln>
             <a:extLst>
               <a:ext uri="{909E8E84-426E-40dd-AFC4-6F175D3DCCD1}">
-                <a14:hiddenFill xmlns:a14="http://schemas.microsoft.com/office/drawing/2010/main" xmlns="">
+                <a14:hiddenFill xmlns="" xmlns:a14="http://schemas.microsoft.com/office/drawing/2010/main">
                   <a:solidFill>
                     <a:srgbClr val="FFFFFF"/>
                   </a:solidFill>
@@ -15054,7 +15054,7 @@
             </a:ln>
             <a:extLst>
               <a:ext uri="{909E8E84-426E-40dd-AFC4-6F175D3DCCD1}">
-                <a14:hiddenFill xmlns:a14="http://schemas.microsoft.com/office/drawing/2010/main" xmlns="">
+                <a14:hiddenFill xmlns="" xmlns:a14="http://schemas.microsoft.com/office/drawing/2010/main">
                   <a:solidFill>
                     <a:srgbClr val="FFFFFF"/>
                   </a:solidFill>
@@ -15095,14 +15095,14 @@
             </a:ln>
             <a:extLst>
               <a:ext uri="{909E8E84-426E-40dd-AFC4-6F175D3DCCD1}">
-                <a14:hiddenFill xmlns:a14="http://schemas.microsoft.com/office/drawing/2010/main" xmlns="">
+                <a14:hiddenFill xmlns="" xmlns:a14="http://schemas.microsoft.com/office/drawing/2010/main">
                   <a:solidFill>
                     <a:srgbClr val="FFFFFF"/>
                   </a:solidFill>
                 </a14:hiddenFill>
               </a:ext>
               <a:ext uri="{91240B29-F687-4f45-9708-019B960494DF}">
-                <a14:hiddenLine xmlns:a14="http://schemas.microsoft.com/office/drawing/2010/main" xmlns="" w="9525">
+                <a14:hiddenLine xmlns="" xmlns:a14="http://schemas.microsoft.com/office/drawing/2010/main" w="9525">
                   <a:solidFill>
                     <a:srgbClr val="000000"/>
                   </a:solidFill>
@@ -15262,14 +15262,14 @@
             </a:ln>
             <a:extLst>
               <a:ext uri="{909E8E84-426E-40dd-AFC4-6F175D3DCCD1}">
-                <a14:hiddenFill xmlns:a14="http://schemas.microsoft.com/office/drawing/2010/main" xmlns="">
+                <a14:hiddenFill xmlns="" xmlns:a14="http://schemas.microsoft.com/office/drawing/2010/main">
                   <a:solidFill>
                     <a:srgbClr val="FFFFFF"/>
                   </a:solidFill>
                 </a14:hiddenFill>
               </a:ext>
               <a:ext uri="{91240B29-F687-4f45-9708-019B960494DF}">
-                <a14:hiddenLine xmlns:a14="http://schemas.microsoft.com/office/drawing/2010/main" xmlns="" w="9525">
+                <a14:hiddenLine xmlns="" xmlns:a14="http://schemas.microsoft.com/office/drawing/2010/main" w="9525">
                   <a:solidFill>
                     <a:srgbClr val="000000"/>
                   </a:solidFill>
@@ -15425,14 +15425,14 @@
             </a:ln>
             <a:extLst>
               <a:ext uri="{909E8E84-426E-40dd-AFC4-6F175D3DCCD1}">
-                <a14:hiddenFill xmlns:a14="http://schemas.microsoft.com/office/drawing/2010/main" xmlns="">
+                <a14:hiddenFill xmlns="" xmlns:a14="http://schemas.microsoft.com/office/drawing/2010/main">
                   <a:solidFill>
                     <a:srgbClr val="FFFFFF"/>
                   </a:solidFill>
                 </a14:hiddenFill>
               </a:ext>
               <a:ext uri="{91240B29-F687-4f45-9708-019B960494DF}">
-                <a14:hiddenLine xmlns:a14="http://schemas.microsoft.com/office/drawing/2010/main" xmlns="" w="9525">
+                <a14:hiddenLine xmlns="" xmlns:a14="http://schemas.microsoft.com/office/drawing/2010/main" w="9525">
                   <a:solidFill>
                     <a:srgbClr val="000000"/>
                   </a:solidFill>
@@ -15588,14 +15588,14 @@
             </a:ln>
             <a:extLst>
               <a:ext uri="{909E8E84-426E-40dd-AFC4-6F175D3DCCD1}">
-                <a14:hiddenFill xmlns:a14="http://schemas.microsoft.com/office/drawing/2010/main" xmlns="">
+                <a14:hiddenFill xmlns="" xmlns:a14="http://schemas.microsoft.com/office/drawing/2010/main">
                   <a:solidFill>
                     <a:srgbClr val="FFFFFF"/>
                   </a:solidFill>
                 </a14:hiddenFill>
               </a:ext>
               <a:ext uri="{91240B29-F687-4f45-9708-019B960494DF}">
-                <a14:hiddenLine xmlns:a14="http://schemas.microsoft.com/office/drawing/2010/main" xmlns="" w="9525">
+                <a14:hiddenLine xmlns="" xmlns:a14="http://schemas.microsoft.com/office/drawing/2010/main" w="9525">
                   <a:solidFill>
                     <a:srgbClr val="000000"/>
                   </a:solidFill>
@@ -15956,10 +15956,21 @@
             </a:r>
           </a:p>
           <a:p>
-            <a:pPr lvl="1"/>
-            <a:r>
-              <a:rPr lang="en-US" dirty="0" smtClean="0"/>
-              <a:t>Can handle data injection but not RST injection</a:t>
+            <a:r>
+              <a:rPr lang="en-US" dirty="0" smtClean="0">
+                <a:solidFill>
+                  <a:srgbClr val="0000FF"/>
+                </a:solidFill>
+              </a:rPr>
+              <a:t>SSL/TLS can </a:t>
+            </a:r>
+            <a:r>
+              <a:rPr lang="en-US" dirty="0" smtClean="0">
+                <a:solidFill>
+                  <a:srgbClr val="0000FF"/>
+                </a:solidFill>
+              </a:rPr>
+              <a:t>handle data injection but not RST injection</a:t>
             </a:r>
           </a:p>
         </p:txBody>
@@ -16051,7 +16062,221 @@
   <p:timing>
     <p:tnLst>
       <p:par>
-        <p:cTn id="1" dur="indefinite" restart="never" nodeType="tmRoot"/>
+        <p:cTn id="1" dur="indefinite" restart="never" nodeType="tmRoot">
+          <p:childTnLst>
+            <p:seq concurrent="1" nextAc="seek">
+              <p:cTn id="2" dur="indefinite" nodeType="mainSeq">
+                <p:childTnLst>
+                  <p:par>
+                    <p:cTn id="3" fill="hold">
+                      <p:stCondLst>
+                        <p:cond delay="indefinite"/>
+                      </p:stCondLst>
+                      <p:childTnLst>
+                        <p:par>
+                          <p:cTn id="4" fill="hold">
+                            <p:stCondLst>
+                              <p:cond delay="0"/>
+                            </p:stCondLst>
+                            <p:childTnLst>
+                              <p:par>
+                                <p:cTn id="5" presetID="1" presetClass="entr" presetSubtype="0" fill="hold" nodeType="clickEffect">
+                                  <p:stCondLst>
+                                    <p:cond delay="0"/>
+                                  </p:stCondLst>
+                                  <p:childTnLst>
+                                    <p:set>
+                                      <p:cBhvr>
+                                        <p:cTn id="6" dur="1" fill="hold">
+                                          <p:stCondLst>
+                                            <p:cond delay="0"/>
+                                          </p:stCondLst>
+                                        </p:cTn>
+                                        <p:tgtEl>
+                                          <p:spTgt spid="3">
+                                            <p:txEl>
+                                              <p:pRg st="4" end="4"/>
+                                            </p:txEl>
+                                          </p:spTgt>
+                                        </p:tgtEl>
+                                        <p:attrNameLst>
+                                          <p:attrName>style.visibility</p:attrName>
+                                        </p:attrNameLst>
+                                      </p:cBhvr>
+                                      <p:to>
+                                        <p:strVal val="visible"/>
+                                      </p:to>
+                                    </p:set>
+                                  </p:childTnLst>
+                                </p:cTn>
+                              </p:par>
+                              <p:par>
+                                <p:cTn id="7" presetID="1" presetClass="entr" presetSubtype="0" fill="hold" nodeType="withEffect">
+                                  <p:stCondLst>
+                                    <p:cond delay="0"/>
+                                  </p:stCondLst>
+                                  <p:childTnLst>
+                                    <p:set>
+                                      <p:cBhvr>
+                                        <p:cTn id="8" dur="1" fill="hold">
+                                          <p:stCondLst>
+                                            <p:cond delay="0"/>
+                                          </p:stCondLst>
+                                        </p:cTn>
+                                        <p:tgtEl>
+                                          <p:spTgt spid="3">
+                                            <p:txEl>
+                                              <p:pRg st="5" end="5"/>
+                                            </p:txEl>
+                                          </p:spTgt>
+                                        </p:tgtEl>
+                                        <p:attrNameLst>
+                                          <p:attrName>style.visibility</p:attrName>
+                                        </p:attrNameLst>
+                                      </p:cBhvr>
+                                      <p:to>
+                                        <p:strVal val="visible"/>
+                                      </p:to>
+                                    </p:set>
+                                  </p:childTnLst>
+                                </p:cTn>
+                              </p:par>
+                              <p:par>
+                                <p:cTn id="9" presetID="1" presetClass="entr" presetSubtype="0" fill="hold" nodeType="withEffect">
+                                  <p:stCondLst>
+                                    <p:cond delay="0"/>
+                                  </p:stCondLst>
+                                  <p:childTnLst>
+                                    <p:set>
+                                      <p:cBhvr>
+                                        <p:cTn id="10" dur="1" fill="hold">
+                                          <p:stCondLst>
+                                            <p:cond delay="0"/>
+                                          </p:stCondLst>
+                                        </p:cTn>
+                                        <p:tgtEl>
+                                          <p:spTgt spid="3">
+                                            <p:txEl>
+                                              <p:pRg st="6" end="6"/>
+                                            </p:txEl>
+                                          </p:spTgt>
+                                        </p:tgtEl>
+                                        <p:attrNameLst>
+                                          <p:attrName>style.visibility</p:attrName>
+                                        </p:attrNameLst>
+                                      </p:cBhvr>
+                                      <p:to>
+                                        <p:strVal val="visible"/>
+                                      </p:to>
+                                    </p:set>
+                                  </p:childTnLst>
+                                </p:cTn>
+                              </p:par>
+                              <p:par>
+                                <p:cTn id="11" presetID="1" presetClass="entr" presetSubtype="0" fill="hold" nodeType="withEffect">
+                                  <p:stCondLst>
+                                    <p:cond delay="0"/>
+                                  </p:stCondLst>
+                                  <p:childTnLst>
+                                    <p:set>
+                                      <p:cBhvr>
+                                        <p:cTn id="12" dur="1" fill="hold">
+                                          <p:stCondLst>
+                                            <p:cond delay="0"/>
+                                          </p:stCondLst>
+                                        </p:cTn>
+                                        <p:tgtEl>
+                                          <p:spTgt spid="3">
+                                            <p:txEl>
+                                              <p:pRg st="7" end="7"/>
+                                            </p:txEl>
+                                          </p:spTgt>
+                                        </p:tgtEl>
+                                        <p:attrNameLst>
+                                          <p:attrName>style.visibility</p:attrName>
+                                        </p:attrNameLst>
+                                      </p:cBhvr>
+                                      <p:to>
+                                        <p:strVal val="visible"/>
+                                      </p:to>
+                                    </p:set>
+                                  </p:childTnLst>
+                                </p:cTn>
+                              </p:par>
+                            </p:childTnLst>
+                          </p:cTn>
+                        </p:par>
+                      </p:childTnLst>
+                    </p:cTn>
+                  </p:par>
+                  <p:par>
+                    <p:cTn id="13" fill="hold">
+                      <p:stCondLst>
+                        <p:cond delay="indefinite"/>
+                      </p:stCondLst>
+                      <p:childTnLst>
+                        <p:par>
+                          <p:cTn id="14" fill="hold">
+                            <p:stCondLst>
+                              <p:cond delay="0"/>
+                            </p:stCondLst>
+                            <p:childTnLst>
+                              <p:par>
+                                <p:cTn id="15" presetID="1" presetClass="entr" presetSubtype="0" fill="hold" nodeType="clickEffect">
+                                  <p:stCondLst>
+                                    <p:cond delay="0"/>
+                                  </p:stCondLst>
+                                  <p:childTnLst>
+                                    <p:set>
+                                      <p:cBhvr>
+                                        <p:cTn id="16" dur="1" fill="hold">
+                                          <p:stCondLst>
+                                            <p:cond delay="0"/>
+                                          </p:stCondLst>
+                                        </p:cTn>
+                                        <p:tgtEl>
+                                          <p:spTgt spid="3">
+                                            <p:txEl>
+                                              <p:pRg st="8" end="8"/>
+                                            </p:txEl>
+                                          </p:spTgt>
+                                        </p:tgtEl>
+                                        <p:attrNameLst>
+                                          <p:attrName>style.visibility</p:attrName>
+                                        </p:attrNameLst>
+                                      </p:cBhvr>
+                                      <p:to>
+                                        <p:strVal val="visible"/>
+                                      </p:to>
+                                    </p:set>
+                                  </p:childTnLst>
+                                </p:cTn>
+                              </p:par>
+                            </p:childTnLst>
+                          </p:cTn>
+                        </p:par>
+                      </p:childTnLst>
+                    </p:cTn>
+                  </p:par>
+                </p:childTnLst>
+              </p:cTn>
+              <p:prevCondLst>
+                <p:cond evt="onPrev" delay="0">
+                  <p:tgtEl>
+                    <p:sldTgt/>
+                  </p:tgtEl>
+                </p:cond>
+              </p:prevCondLst>
+              <p:nextCondLst>
+                <p:cond evt="onNext" delay="0">
+                  <p:tgtEl>
+                    <p:sldTgt/>
+                  </p:tgtEl>
+                </p:cond>
+              </p:nextCondLst>
+            </p:seq>
+          </p:childTnLst>
+        </p:cTn>
       </p:par>
     </p:tnLst>
   </p:timing>
@@ -16092,11 +16317,7 @@
           <a:p>
             <a:r>
               <a:rPr lang="en-US" dirty="0" smtClean="0"/>
-              <a:t>A q</a:t>
-            </a:r>
-            <a:r>
-              <a:rPr lang="en-US" dirty="0" smtClean="0"/>
-              <a:t>uick security analysis of the IP header</a:t>
+              <a:t>A quick security analysis of the IP header</a:t>
             </a:r>
             <a:endParaRPr lang="en-US" dirty="0"/>
           </a:p>
@@ -18531,11 +18752,7 @@
             <a:pPr lvl="1"/>
             <a:r>
               <a:rPr lang="en-US" dirty="0" smtClean="0"/>
-              <a:t>Put someone else</a:t>
-            </a:r>
-            <a:r>
-              <a:rPr lang="en-US" dirty="0" smtClean="0"/>
-              <a:t>’</a:t>
+              <a:t>Put someone else’</a:t>
             </a:r>
             <a:r>
               <a:rPr lang="en-US" altLang="ja-JP" dirty="0" smtClean="0"/>
@@ -18546,11 +18763,7 @@
             <a:pPr lvl="2"/>
             <a:r>
               <a:rPr lang="en-US" dirty="0" smtClean="0"/>
-              <a:t>Or: use many different ones so can</a:t>
-            </a:r>
-            <a:r>
-              <a:rPr lang="en-US" dirty="0" smtClean="0"/>
-              <a:t>’</a:t>
+              <a:t>Or: use many different ones so can’</a:t>
             </a:r>
             <a:r>
               <a:rPr lang="en-US" altLang="ja-JP" dirty="0" smtClean="0"/>
@@ -19013,19 +19226,23 @@
           <a:p>
             <a:pPr lvl="1"/>
             <a:r>
+              <a:rPr lang="en-US" dirty="0" smtClean="0">
+                <a:solidFill>
+                  <a:srgbClr val="0000FF"/>
+                </a:solidFill>
+              </a:rPr>
+              <a:t>Misuse</a:t>
+            </a:r>
+            <a:r>
               <a:rPr lang="en-US" dirty="0" smtClean="0"/>
-              <a:t>Misuse: e.g., Source Route lets sender control path taken through network - say, sidestep security monitoring</a:t>
+              <a:t>: e.g., Source Route lets sender control path taken through network - say, sidestep security monitoring</a:t>
             </a:r>
           </a:p>
           <a:p>
             <a:pPr lvl="1"/>
             <a:r>
               <a:rPr lang="en-US" dirty="0" smtClean="0"/>
-              <a:t>IP options often processed in router</a:t>
-            </a:r>
-            <a:r>
-              <a:rPr lang="en-US" dirty="0" smtClean="0"/>
-              <a:t>’</a:t>
+              <a:t>IP options often processed in router’</a:t>
             </a:r>
             <a:r>
               <a:rPr lang="en-US" altLang="ja-JP" dirty="0" smtClean="0"/>
@@ -19860,11 +20077,7 @@
             <a:pPr lvl="1"/>
             <a:r>
               <a:rPr lang="en-US" dirty="0" smtClean="0"/>
-              <a:t>Packet inspection won</a:t>
-            </a:r>
-            <a:r>
-              <a:rPr lang="en-US" dirty="0" smtClean="0"/>
-              <a:t>’</a:t>
+              <a:t>Packet inspection won’</a:t>
             </a:r>
             <a:r>
               <a:rPr lang="en-US" altLang="ja-JP" dirty="0" smtClean="0"/>
@@ -19920,8 +20133,8 @@
         </p:nvGrpSpPr>
         <p:grpSpPr bwMode="auto">
           <a:xfrm>
-            <a:off x="1460500" y="3603625"/>
-            <a:ext cx="2135188" cy="968375"/>
+            <a:off x="1460500" y="3603627"/>
+            <a:ext cx="2135188" cy="968376"/>
             <a:chOff x="872" y="1195"/>
             <a:chExt cx="1345" cy="610"/>
           </a:xfrm>
@@ -19950,7 +20163,7 @@
             </a:ln>
             <a:extLst>
               <a:ext uri="{91240B29-F687-4f45-9708-019B960494DF}">
-                <a14:hiddenLine xmlns="" xmlns:a14="http://schemas.microsoft.com/office/drawing/2010/main" w="9525">
+                <a14:hiddenLine xmlns:a14="http://schemas.microsoft.com/office/drawing/2010/main" xmlns="" w="9525">
                   <a:solidFill>
                     <a:srgbClr val="000000"/>
                   </a:solidFill>
@@ -20080,7 +20293,7 @@
                 </a:spcBef>
               </a:pPr>
               <a:r>
-                <a:rPr lang="en-US" sz="3200"/>
+                <a:rPr lang="en-US" sz="3200" dirty="0"/>
                 <a:t>Nasty-at</a:t>
               </a:r>
             </a:p>
@@ -20108,14 +20321,14 @@
             </a:ln>
             <a:extLst>
               <a:ext uri="{909E8E84-426E-40dd-AFC4-6F175D3DCCD1}">
-                <a14:hiddenFill xmlns="" xmlns:a14="http://schemas.microsoft.com/office/drawing/2010/main">
+                <a14:hiddenFill xmlns:a14="http://schemas.microsoft.com/office/drawing/2010/main" xmlns="">
                   <a:solidFill>
                     <a:srgbClr val="FFFFFF"/>
                   </a:solidFill>
                 </a14:hiddenFill>
               </a:ext>
               <a:ext uri="{91240B29-F687-4f45-9708-019B960494DF}">
-                <a14:hiddenLine xmlns="" xmlns:a14="http://schemas.microsoft.com/office/drawing/2010/main" w="9525">
+                <a14:hiddenLine xmlns:a14="http://schemas.microsoft.com/office/drawing/2010/main" xmlns="" w="9525">
                   <a:solidFill>
                     <a:srgbClr val="000000"/>
                   </a:solidFill>
@@ -20276,7 +20489,7 @@
           </a:ln>
           <a:extLst>
             <a:ext uri="{91240B29-F687-4f45-9708-019B960494DF}">
-              <a14:hiddenLine xmlns="" xmlns:a14="http://schemas.microsoft.com/office/drawing/2010/main" w="9525">
+              <a14:hiddenLine xmlns:a14="http://schemas.microsoft.com/office/drawing/2010/main" xmlns="" w="9525">
                 <a:solidFill>
                   <a:srgbClr val="000000"/>
                 </a:solidFill>
@@ -20434,14 +20647,14 @@
           </a:ln>
           <a:extLst>
             <a:ext uri="{909E8E84-426E-40dd-AFC4-6F175D3DCCD1}">
-              <a14:hiddenFill xmlns="" xmlns:a14="http://schemas.microsoft.com/office/drawing/2010/main">
+              <a14:hiddenFill xmlns:a14="http://schemas.microsoft.com/office/drawing/2010/main" xmlns="">
                 <a:solidFill>
                   <a:srgbClr val="FFFFFF"/>
                 </a:solidFill>
               </a14:hiddenFill>
             </a:ext>
             <a:ext uri="{91240B29-F687-4f45-9708-019B960494DF}">
-              <a14:hiddenLine xmlns="" xmlns:a14="http://schemas.microsoft.com/office/drawing/2010/main" w="9525">
+              <a14:hiddenLine xmlns:a14="http://schemas.microsoft.com/office/drawing/2010/main" xmlns="" w="9525">
                 <a:solidFill>
                   <a:srgbClr val="000000"/>
                 </a:solidFill>
@@ -21459,15 +21672,7 @@
             </a:r>
             <a:r>
               <a:rPr lang="en-US" altLang="ja-JP" dirty="0" smtClean="0"/>
-              <a:t>is somewhat distinctive to sender</a:t>
-            </a:r>
-            <a:r>
-              <a:rPr lang="en-US" altLang="ja-JP" dirty="0" smtClean="0"/>
-              <a:t>’</a:t>
-            </a:r>
-            <a:r>
-              <a:rPr lang="en-US" altLang="ja-JP" dirty="0" smtClean="0"/>
-              <a:t>s operating system. This plus other such initializations allow OS </a:t>
+              <a:t>is somewhat distinctive to sender’s operating system. This plus other such initializations allow OS </a:t>
             </a:r>
             <a:r>
               <a:rPr lang="en-US" altLang="ja-JP" dirty="0" smtClean="0">
@@ -21489,80 +21694,6 @@
               <a:t>Which allow attacker to infer its likely vulnerabilities</a:t>
             </a:r>
             <a:endParaRPr lang="en-US" dirty="0"/>
-          </a:p>
-        </p:txBody>
-      </p:sp>
-      <p:sp>
-        <p:nvSpPr>
-          <p:cNvPr id="4" name="Date Placeholder 3"/>
-          <p:cNvSpPr>
-            <a:spLocks noGrp="1"/>
-          </p:cNvSpPr>
-          <p:nvPr>
-            <p:ph type="dt" sz="half" idx="10"/>
-          </p:nvPr>
-        </p:nvSpPr>
-        <p:spPr/>
-        <p:txBody>
-          <a:bodyPr/>
-          <a:lstStyle/>
-          <a:p>
-            <a:r>
-              <a:rPr lang="en-US" smtClean="0"/>
-              <a:t>April 12, 2017</a:t>
-            </a:r>
-            <a:endParaRPr lang="en-US" sz="1050" b="0">
-              <a:latin typeface="Times New Roman" charset="0"/>
-            </a:endParaRPr>
-          </a:p>
-        </p:txBody>
-      </p:sp>
-      <p:sp>
-        <p:nvSpPr>
-          <p:cNvPr id="5" name="Footer Placeholder 4"/>
-          <p:cNvSpPr>
-            <a:spLocks noGrp="1"/>
-          </p:cNvSpPr>
-          <p:nvPr>
-            <p:ph type="ftr" sz="quarter" idx="11"/>
-          </p:nvPr>
-        </p:nvSpPr>
-        <p:spPr/>
-        <p:txBody>
-          <a:bodyPr/>
-          <a:lstStyle/>
-          <a:p>
-            <a:r>
-              <a:rPr lang="en-US" smtClean="0"/>
-              <a:t>EECS 489 – Lecture 24</a:t>
-            </a:r>
-            <a:endParaRPr lang="en-US" sz="1050" b="0">
-              <a:latin typeface="Times New Roman" charset="0"/>
-            </a:endParaRPr>
-          </a:p>
-        </p:txBody>
-      </p:sp>
-      <p:sp>
-        <p:nvSpPr>
-          <p:cNvPr id="6" name="Slide Number Placeholder 5"/>
-          <p:cNvSpPr>
-            <a:spLocks noGrp="1"/>
-          </p:cNvSpPr>
-          <p:nvPr>
-            <p:ph type="sldNum" sz="quarter" idx="12"/>
-          </p:nvPr>
-        </p:nvSpPr>
-        <p:spPr/>
-        <p:txBody>
-          <a:bodyPr/>
-          <a:lstStyle/>
-          <a:p>
-            <a:fld id="{A190D881-957A-7944-A8D0-1584E528B88F}" type="slidenum">
-              <a:rPr lang="en-US" smtClean="0"/>
-              <a:pPr/>
-              <a:t>26</a:t>
-            </a:fld>
-            <a:endParaRPr lang="en-US"/>
           </a:p>
         </p:txBody>
       </p:sp>
@@ -21948,11 +22079,7 @@
             <a:pPr lvl="1"/>
             <a:r>
               <a:rPr lang="en-US" dirty="0" smtClean="0"/>
-              <a:t>It</a:t>
-            </a:r>
-            <a:r>
-              <a:rPr lang="en-US" dirty="0" smtClean="0"/>
-              <a:t>’</a:t>
+              <a:t>It’</a:t>
             </a:r>
             <a:r>
               <a:rPr lang="en-US" altLang="ja-JP" dirty="0" smtClean="0"/>
@@ -22303,7 +22430,6 @@
               <a:rPr lang="en-US" dirty="0" smtClean="0"/>
               <a:t>Teaching evaluations due on April 19</a:t>
             </a:r>
-            <a:endParaRPr lang="en-US" dirty="0" smtClean="0"/>
           </a:p>
         </p:txBody>
       </p:sp>
@@ -22612,14 +22738,14 @@
           </a:ln>
           <a:extLst>
             <a:ext uri="{909E8E84-426E-40dd-AFC4-6F175D3DCCD1}">
-              <a14:hiddenFill xmlns:a14="http://schemas.microsoft.com/office/drawing/2010/main" xmlns="">
+              <a14:hiddenFill xmlns="" xmlns:a14="http://schemas.microsoft.com/office/drawing/2010/main">
                 <a:solidFill>
                   <a:srgbClr val="FFFFFF"/>
                 </a:solidFill>
               </a14:hiddenFill>
             </a:ext>
             <a:ext uri="{91240B29-F687-4f45-9708-019B960494DF}">
-              <a14:hiddenLine xmlns:a14="http://schemas.microsoft.com/office/drawing/2010/main" xmlns="" w="25400">
+              <a14:hiddenLine xmlns="" xmlns:a14="http://schemas.microsoft.com/office/drawing/2010/main" w="25400">
                 <a:solidFill>
                   <a:srgbClr val="000000"/>
                 </a:solidFill>
@@ -22819,14 +22945,14 @@
           </a:ln>
           <a:extLst>
             <a:ext uri="{909E8E84-426E-40dd-AFC4-6F175D3DCCD1}">
-              <a14:hiddenFill xmlns:a14="http://schemas.microsoft.com/office/drawing/2010/main" xmlns="">
+              <a14:hiddenFill xmlns="" xmlns:a14="http://schemas.microsoft.com/office/drawing/2010/main">
                 <a:solidFill>
                   <a:srgbClr val="FFFFFF"/>
                 </a:solidFill>
               </a14:hiddenFill>
             </a:ext>
             <a:ext uri="{91240B29-F687-4f45-9708-019B960494DF}">
-              <a14:hiddenLine xmlns:a14="http://schemas.microsoft.com/office/drawing/2010/main" xmlns="" w="25400">
+              <a14:hiddenLine xmlns="" xmlns:a14="http://schemas.microsoft.com/office/drawing/2010/main" w="25400">
                 <a:solidFill>
                   <a:srgbClr val="000000"/>
                 </a:solidFill>
@@ -23026,14 +23152,14 @@
           </a:ln>
           <a:extLst>
             <a:ext uri="{909E8E84-426E-40dd-AFC4-6F175D3DCCD1}">
-              <a14:hiddenFill xmlns:a14="http://schemas.microsoft.com/office/drawing/2010/main" xmlns="">
+              <a14:hiddenFill xmlns="" xmlns:a14="http://schemas.microsoft.com/office/drawing/2010/main">
                 <a:solidFill>
                   <a:srgbClr val="FFFFFF"/>
                 </a:solidFill>
               </a14:hiddenFill>
             </a:ext>
             <a:ext uri="{91240B29-F687-4f45-9708-019B960494DF}">
-              <a14:hiddenLine xmlns:a14="http://schemas.microsoft.com/office/drawing/2010/main" xmlns="" w="25400">
+              <a14:hiddenLine xmlns="" xmlns:a14="http://schemas.microsoft.com/office/drawing/2010/main" w="25400">
                 <a:solidFill>
                   <a:srgbClr val="000000"/>
                 </a:solidFill>
@@ -23197,7 +23323,7 @@
           </a:ln>
           <a:extLst>
             <a:ext uri="{909E8E84-426E-40dd-AFC4-6F175D3DCCD1}">
-              <a14:hiddenFill xmlns:a14="http://schemas.microsoft.com/office/drawing/2010/main" xmlns="">
+              <a14:hiddenFill xmlns="" xmlns:a14="http://schemas.microsoft.com/office/drawing/2010/main">
                 <a:noFill/>
               </a14:hiddenFill>
             </a:ext>
@@ -23232,7 +23358,7 @@
           </a:ln>
           <a:extLst>
             <a:ext uri="{909E8E84-426E-40dd-AFC4-6F175D3DCCD1}">
-              <a14:hiddenFill xmlns:a14="http://schemas.microsoft.com/office/drawing/2010/main" xmlns="">
+              <a14:hiddenFill xmlns="" xmlns:a14="http://schemas.microsoft.com/office/drawing/2010/main">
                 <a:noFill/>
               </a14:hiddenFill>
             </a:ext>
@@ -23267,7 +23393,7 @@
           </a:ln>
           <a:extLst>
             <a:ext uri="{909E8E84-426E-40dd-AFC4-6F175D3DCCD1}">
-              <a14:hiddenFill xmlns:a14="http://schemas.microsoft.com/office/drawing/2010/main" xmlns="">
+              <a14:hiddenFill xmlns="" xmlns:a14="http://schemas.microsoft.com/office/drawing/2010/main">
                 <a:noFill/>
               </a14:hiddenFill>
             </a:ext>
@@ -23302,7 +23428,7 @@
           </a:ln>
           <a:extLst>
             <a:ext uri="{909E8E84-426E-40dd-AFC4-6F175D3DCCD1}">
-              <a14:hiddenFill xmlns:a14="http://schemas.microsoft.com/office/drawing/2010/main" xmlns="">
+              <a14:hiddenFill xmlns="" xmlns:a14="http://schemas.microsoft.com/office/drawing/2010/main">
                 <a:noFill/>
               </a14:hiddenFill>
             </a:ext>
@@ -23337,7 +23463,7 @@
           </a:ln>
           <a:extLst>
             <a:ext uri="{909E8E84-426E-40dd-AFC4-6F175D3DCCD1}">
-              <a14:hiddenFill xmlns:a14="http://schemas.microsoft.com/office/drawing/2010/main" xmlns="">
+              <a14:hiddenFill xmlns="" xmlns:a14="http://schemas.microsoft.com/office/drawing/2010/main">
                 <a:noFill/>
               </a14:hiddenFill>
             </a:ext>
@@ -23372,7 +23498,7 @@
           </a:ln>
           <a:extLst>
             <a:ext uri="{909E8E84-426E-40dd-AFC4-6F175D3DCCD1}">
-              <a14:hiddenFill xmlns:a14="http://schemas.microsoft.com/office/drawing/2010/main" xmlns="">
+              <a14:hiddenFill xmlns="" xmlns:a14="http://schemas.microsoft.com/office/drawing/2010/main">
                 <a:noFill/>
               </a14:hiddenFill>
             </a:ext>
@@ -23407,7 +23533,7 @@
           </a:ln>
           <a:extLst>
             <a:ext uri="{909E8E84-426E-40dd-AFC4-6F175D3DCCD1}">
-              <a14:hiddenFill xmlns:a14="http://schemas.microsoft.com/office/drawing/2010/main" xmlns="">
+              <a14:hiddenFill xmlns="" xmlns:a14="http://schemas.microsoft.com/office/drawing/2010/main">
                 <a:noFill/>
               </a14:hiddenFill>
             </a:ext>
@@ -23492,14 +23618,14 @@
             </a:ln>
             <a:extLst>
               <a:ext uri="{909E8E84-426E-40dd-AFC4-6F175D3DCCD1}">
-                <a14:hiddenFill xmlns:a14="http://schemas.microsoft.com/office/drawing/2010/main" xmlns="">
+                <a14:hiddenFill xmlns="" xmlns:a14="http://schemas.microsoft.com/office/drawing/2010/main">
                   <a:solidFill>
                     <a:srgbClr val="FFFFFF"/>
                   </a:solidFill>
                 </a14:hiddenFill>
               </a:ext>
               <a:ext uri="{91240B29-F687-4f45-9708-019B960494DF}">
-                <a14:hiddenLine xmlns:a14="http://schemas.microsoft.com/office/drawing/2010/main" xmlns="" w="25400">
+                <a14:hiddenLine xmlns="" xmlns:a14="http://schemas.microsoft.com/office/drawing/2010/main" w="25400">
                   <a:solidFill>
                     <a:srgbClr val="000000"/>
                   </a:solidFill>
@@ -23702,14 +23828,14 @@
             </a:ln>
             <a:extLst>
               <a:ext uri="{909E8E84-426E-40dd-AFC4-6F175D3DCCD1}">
-                <a14:hiddenFill xmlns:a14="http://schemas.microsoft.com/office/drawing/2010/main" xmlns="">
+                <a14:hiddenFill xmlns="" xmlns:a14="http://schemas.microsoft.com/office/drawing/2010/main">
                   <a:solidFill>
                     <a:srgbClr val="FFFFFF"/>
                   </a:solidFill>
                 </a14:hiddenFill>
               </a:ext>
               <a:ext uri="{91240B29-F687-4f45-9708-019B960494DF}">
-                <a14:hiddenLine xmlns:a14="http://schemas.microsoft.com/office/drawing/2010/main" xmlns="" w="25400">
+                <a14:hiddenLine xmlns="" xmlns:a14="http://schemas.microsoft.com/office/drawing/2010/main" w="25400">
                   <a:solidFill>
                     <a:srgbClr val="000000"/>
                   </a:solidFill>
@@ -23909,14 +24035,14 @@
             </a:ln>
             <a:extLst>
               <a:ext uri="{909E8E84-426E-40dd-AFC4-6F175D3DCCD1}">
-                <a14:hiddenFill xmlns:a14="http://schemas.microsoft.com/office/drawing/2010/main" xmlns="">
+                <a14:hiddenFill xmlns="" xmlns:a14="http://schemas.microsoft.com/office/drawing/2010/main">
                   <a:solidFill>
                     <a:srgbClr val="FFFFFF"/>
                   </a:solidFill>
                 </a14:hiddenFill>
               </a:ext>
               <a:ext uri="{91240B29-F687-4f45-9708-019B960494DF}">
-                <a14:hiddenLine xmlns:a14="http://schemas.microsoft.com/office/drawing/2010/main" xmlns="" w="25400">
+                <a14:hiddenLine xmlns="" xmlns:a14="http://schemas.microsoft.com/office/drawing/2010/main" w="25400">
                   <a:solidFill>
                     <a:srgbClr val="000000"/>
                   </a:solidFill>
@@ -24116,14 +24242,14 @@
             </a:ln>
             <a:extLst>
               <a:ext uri="{909E8E84-426E-40dd-AFC4-6F175D3DCCD1}">
-                <a14:hiddenFill xmlns:a14="http://schemas.microsoft.com/office/drawing/2010/main" xmlns="">
+                <a14:hiddenFill xmlns="" xmlns:a14="http://schemas.microsoft.com/office/drawing/2010/main">
                   <a:solidFill>
                     <a:srgbClr val="FFFFFF"/>
                   </a:solidFill>
                 </a14:hiddenFill>
               </a:ext>
               <a:ext uri="{91240B29-F687-4f45-9708-019B960494DF}">
-                <a14:hiddenLine xmlns:a14="http://schemas.microsoft.com/office/drawing/2010/main" xmlns="" w="25400">
+                <a14:hiddenLine xmlns="" xmlns:a14="http://schemas.microsoft.com/office/drawing/2010/main" w="25400">
                   <a:solidFill>
                     <a:srgbClr val="000000"/>
                   </a:solidFill>
@@ -24323,14 +24449,14 @@
             </a:ln>
             <a:extLst>
               <a:ext uri="{909E8E84-426E-40dd-AFC4-6F175D3DCCD1}">
-                <a14:hiddenFill xmlns:a14="http://schemas.microsoft.com/office/drawing/2010/main" xmlns="">
+                <a14:hiddenFill xmlns="" xmlns:a14="http://schemas.microsoft.com/office/drawing/2010/main">
                   <a:solidFill>
                     <a:srgbClr val="FFFFFF"/>
                   </a:solidFill>
                 </a14:hiddenFill>
               </a:ext>
               <a:ext uri="{91240B29-F687-4f45-9708-019B960494DF}">
-                <a14:hiddenLine xmlns:a14="http://schemas.microsoft.com/office/drawing/2010/main" xmlns="" w="25400">
+                <a14:hiddenLine xmlns="" xmlns:a14="http://schemas.microsoft.com/office/drawing/2010/main" w="25400">
                   <a:solidFill>
                     <a:srgbClr val="000000"/>
                   </a:solidFill>
@@ -24548,14 +24674,14 @@
             </a:ln>
             <a:extLst>
               <a:ext uri="{909E8E84-426E-40dd-AFC4-6F175D3DCCD1}">
-                <a14:hiddenFill xmlns:a14="http://schemas.microsoft.com/office/drawing/2010/main" xmlns="">
+                <a14:hiddenFill xmlns="" xmlns:a14="http://schemas.microsoft.com/office/drawing/2010/main">
                   <a:solidFill>
                     <a:srgbClr val="FFFFFF"/>
                   </a:solidFill>
                 </a14:hiddenFill>
               </a:ext>
               <a:ext uri="{91240B29-F687-4f45-9708-019B960494DF}">
-                <a14:hiddenLine xmlns:a14="http://schemas.microsoft.com/office/drawing/2010/main" xmlns="" w="25400">
+                <a14:hiddenLine xmlns="" xmlns:a14="http://schemas.microsoft.com/office/drawing/2010/main" w="25400">
                   <a:solidFill>
                     <a:srgbClr val="000000"/>
                   </a:solidFill>
@@ -24758,14 +24884,14 @@
             </a:ln>
             <a:extLst>
               <a:ext uri="{909E8E84-426E-40dd-AFC4-6F175D3DCCD1}">
-                <a14:hiddenFill xmlns:a14="http://schemas.microsoft.com/office/drawing/2010/main" xmlns="">
+                <a14:hiddenFill xmlns="" xmlns:a14="http://schemas.microsoft.com/office/drawing/2010/main">
                   <a:solidFill>
                     <a:srgbClr val="FFFFFF"/>
                   </a:solidFill>
                 </a14:hiddenFill>
               </a:ext>
               <a:ext uri="{91240B29-F687-4f45-9708-019B960494DF}">
-                <a14:hiddenLine xmlns:a14="http://schemas.microsoft.com/office/drawing/2010/main" xmlns="" w="25400">
+                <a14:hiddenLine xmlns="" xmlns:a14="http://schemas.microsoft.com/office/drawing/2010/main" w="25400">
                   <a:solidFill>
                     <a:srgbClr val="000000"/>
                   </a:solidFill>
@@ -24965,14 +25091,14 @@
             </a:ln>
             <a:extLst>
               <a:ext uri="{909E8E84-426E-40dd-AFC4-6F175D3DCCD1}">
-                <a14:hiddenFill xmlns:a14="http://schemas.microsoft.com/office/drawing/2010/main" xmlns="">
+                <a14:hiddenFill xmlns="" xmlns:a14="http://schemas.microsoft.com/office/drawing/2010/main">
                   <a:solidFill>
                     <a:srgbClr val="FFFFFF"/>
                   </a:solidFill>
                 </a14:hiddenFill>
               </a:ext>
               <a:ext uri="{91240B29-F687-4f45-9708-019B960494DF}">
-                <a14:hiddenLine xmlns:a14="http://schemas.microsoft.com/office/drawing/2010/main" xmlns="" w="25400">
+                <a14:hiddenLine xmlns="" xmlns:a14="http://schemas.microsoft.com/office/drawing/2010/main" w="25400">
                   <a:solidFill>
                     <a:srgbClr val="000000"/>
                   </a:solidFill>
@@ -25172,14 +25298,14 @@
             </a:ln>
             <a:extLst>
               <a:ext uri="{909E8E84-426E-40dd-AFC4-6F175D3DCCD1}">
-                <a14:hiddenFill xmlns:a14="http://schemas.microsoft.com/office/drawing/2010/main" xmlns="">
+                <a14:hiddenFill xmlns="" xmlns:a14="http://schemas.microsoft.com/office/drawing/2010/main">
                   <a:solidFill>
                     <a:srgbClr val="FFFFFF"/>
                   </a:solidFill>
                 </a14:hiddenFill>
               </a:ext>
               <a:ext uri="{91240B29-F687-4f45-9708-019B960494DF}">
-                <a14:hiddenLine xmlns:a14="http://schemas.microsoft.com/office/drawing/2010/main" xmlns="" w="25400">
+                <a14:hiddenLine xmlns="" xmlns:a14="http://schemas.microsoft.com/office/drawing/2010/main" w="25400">
                   <a:solidFill>
                     <a:srgbClr val="000000"/>
                   </a:solidFill>
@@ -25379,14 +25505,14 @@
             </a:ln>
             <a:extLst>
               <a:ext uri="{909E8E84-426E-40dd-AFC4-6F175D3DCCD1}">
-                <a14:hiddenFill xmlns:a14="http://schemas.microsoft.com/office/drawing/2010/main" xmlns="">
+                <a14:hiddenFill xmlns="" xmlns:a14="http://schemas.microsoft.com/office/drawing/2010/main">
                   <a:solidFill>
                     <a:srgbClr val="FFFFFF"/>
                   </a:solidFill>
                 </a14:hiddenFill>
               </a:ext>
               <a:ext uri="{91240B29-F687-4f45-9708-019B960494DF}">
-                <a14:hiddenLine xmlns:a14="http://schemas.microsoft.com/office/drawing/2010/main" xmlns="" w="25400">
+                <a14:hiddenLine xmlns="" xmlns:a14="http://schemas.microsoft.com/office/drawing/2010/main" w="25400">
                   <a:solidFill>
                     <a:srgbClr val="000000"/>
                   </a:solidFill>
@@ -25554,7 +25680,7 @@
           </a:ln>
           <a:extLst>
             <a:ext uri="{909E8E84-426E-40dd-AFC4-6F175D3DCCD1}">
-              <a14:hiddenFill xmlns:a14="http://schemas.microsoft.com/office/drawing/2010/main" xmlns="">
+              <a14:hiddenFill xmlns="" xmlns:a14="http://schemas.microsoft.com/office/drawing/2010/main">
                 <a:noFill/>
               </a14:hiddenFill>
             </a:ext>
@@ -25583,14 +25709,14 @@
           </a:ln>
           <a:extLst>
             <a:ext uri="{909E8E84-426E-40dd-AFC4-6F175D3DCCD1}">
-              <a14:hiddenFill xmlns:a14="http://schemas.microsoft.com/office/drawing/2010/main" xmlns="">
+              <a14:hiddenFill xmlns="" xmlns:a14="http://schemas.microsoft.com/office/drawing/2010/main">
                 <a:solidFill>
                   <a:srgbClr val="FFFFFF"/>
                 </a:solidFill>
               </a14:hiddenFill>
             </a:ext>
             <a:ext uri="{91240B29-F687-4f45-9708-019B960494DF}">
-              <a14:hiddenLine xmlns:a14="http://schemas.microsoft.com/office/drawing/2010/main" xmlns="" w="12700">
+              <a14:hiddenLine xmlns="" xmlns:a14="http://schemas.microsoft.com/office/drawing/2010/main" w="12700">
                 <a:solidFill>
                   <a:srgbClr val="000000"/>
                 </a:solidFill>
@@ -25751,14 +25877,14 @@
           </a:ln>
           <a:extLst>
             <a:ext uri="{909E8E84-426E-40dd-AFC4-6F175D3DCCD1}">
-              <a14:hiddenFill xmlns:a14="http://schemas.microsoft.com/office/drawing/2010/main" xmlns="">
+              <a14:hiddenFill xmlns="" xmlns:a14="http://schemas.microsoft.com/office/drawing/2010/main">
                 <a:solidFill>
                   <a:srgbClr val="FFFFFF"/>
                 </a:solidFill>
               </a14:hiddenFill>
             </a:ext>
             <a:ext uri="{91240B29-F687-4f45-9708-019B960494DF}">
-              <a14:hiddenLine xmlns:a14="http://schemas.microsoft.com/office/drawing/2010/main" xmlns="" w="12700">
+              <a14:hiddenLine xmlns="" xmlns:a14="http://schemas.microsoft.com/office/drawing/2010/main" w="12700">
                 <a:solidFill>
                   <a:srgbClr val="000000"/>
                 </a:solidFill>
@@ -25919,14 +26045,14 @@
           </a:ln>
           <a:extLst>
             <a:ext uri="{909E8E84-426E-40dd-AFC4-6F175D3DCCD1}">
-              <a14:hiddenFill xmlns:a14="http://schemas.microsoft.com/office/drawing/2010/main" xmlns="">
+              <a14:hiddenFill xmlns="" xmlns:a14="http://schemas.microsoft.com/office/drawing/2010/main">
                 <a:solidFill>
                   <a:srgbClr val="FFFFFF"/>
                 </a:solidFill>
               </a14:hiddenFill>
             </a:ext>
             <a:ext uri="{91240B29-F687-4f45-9708-019B960494DF}">
-              <a14:hiddenLine xmlns:a14="http://schemas.microsoft.com/office/drawing/2010/main" xmlns="" w="12700">
+              <a14:hiddenLine xmlns="" xmlns:a14="http://schemas.microsoft.com/office/drawing/2010/main" w="12700">
                 <a:solidFill>
                   <a:srgbClr val="000000"/>
                 </a:solidFill>
@@ -26196,7 +26322,7 @@
           </a:ln>
           <a:extLst>
             <a:ext uri="{909E8E84-426E-40dd-AFC4-6F175D3DCCD1}">
-              <a14:hiddenFill xmlns:a14="http://schemas.microsoft.com/office/drawing/2010/main" xmlns="">
+              <a14:hiddenFill xmlns="" xmlns:a14="http://schemas.microsoft.com/office/drawing/2010/main">
                 <a:solidFill>
                   <a:srgbClr val="FFFFFF"/>
                 </a:solidFill>
@@ -26448,8 +26574,13 @@
           <a:p>
             <a:r>
               <a:rPr lang="en-US" dirty="0" smtClean="0"/>
-              <a:t>Benefits of network-layer security:</a:t>
-            </a:r>
+              <a:t>Benefits of network-layer </a:t>
+            </a:r>
+            <a:r>
+              <a:rPr lang="en-US" dirty="0" smtClean="0"/>
+              <a:t>security</a:t>
+            </a:r>
+            <a:endParaRPr lang="en-US" dirty="0" smtClean="0"/>
           </a:p>
           <a:p>
             <a:pPr lvl="1"/>
@@ -26760,7 +26891,6 @@
               <a:rPr lang="en-US" dirty="0" smtClean="0"/>
               <a:t>, optional in IPv4</a:t>
             </a:r>
-            <a:endParaRPr lang="en-US" dirty="0" smtClean="0"/>
           </a:p>
         </p:txBody>
       </p:sp>
@@ -27111,7 +27241,7 @@
           </a:ln>
           <a:extLst>
             <a:ext uri="{91240B29-F687-4f45-9708-019B960494DF}">
-              <a14:hiddenLine xmlns:a14="http://schemas.microsoft.com/office/drawing/2010/main" xmlns="" w="9525">
+              <a14:hiddenLine xmlns="" xmlns:a14="http://schemas.microsoft.com/office/drawing/2010/main" w="9525">
                 <a:solidFill>
                   <a:srgbClr val="000000"/>
                 </a:solidFill>
@@ -27157,7 +27287,7 @@
           </a:ln>
           <a:extLst>
             <a:ext uri="{909E8E84-426E-40dd-AFC4-6F175D3DCCD1}">
-              <a14:hiddenFill xmlns:a14="http://schemas.microsoft.com/office/drawing/2010/main" xmlns="">
+              <a14:hiddenFill xmlns="" xmlns:a14="http://schemas.microsoft.com/office/drawing/2010/main">
                 <a:noFill/>
               </a14:hiddenFill>
             </a:ext>
@@ -27198,7 +27328,7 @@
           </a:ln>
           <a:extLst>
             <a:ext uri="{909E8E84-426E-40dd-AFC4-6F175D3DCCD1}">
-              <a14:hiddenFill xmlns:a14="http://schemas.microsoft.com/office/drawing/2010/main" xmlns="">
+              <a14:hiddenFill xmlns="" xmlns:a14="http://schemas.microsoft.com/office/drawing/2010/main">
                 <a:noFill/>
               </a14:hiddenFill>
             </a:ext>
@@ -27239,7 +27369,7 @@
           </a:ln>
           <a:extLst>
             <a:ext uri="{909E8E84-426E-40dd-AFC4-6F175D3DCCD1}">
-              <a14:hiddenFill xmlns:a14="http://schemas.microsoft.com/office/drawing/2010/main" xmlns="">
+              <a14:hiddenFill xmlns="" xmlns:a14="http://schemas.microsoft.com/office/drawing/2010/main">
                 <a:noFill/>
               </a14:hiddenFill>
             </a:ext>
@@ -27275,14 +27405,14 @@
           </a:ln>
           <a:extLst>
             <a:ext uri="{909E8E84-426E-40dd-AFC4-6F175D3DCCD1}">
-              <a14:hiddenFill xmlns:a14="http://schemas.microsoft.com/office/drawing/2010/main" xmlns="">
+              <a14:hiddenFill xmlns="" xmlns:a14="http://schemas.microsoft.com/office/drawing/2010/main">
                 <a:solidFill>
                   <a:srgbClr val="FFFFFF"/>
                 </a:solidFill>
               </a14:hiddenFill>
             </a:ext>
             <a:ext uri="{91240B29-F687-4f45-9708-019B960494DF}">
-              <a14:hiddenLine xmlns:a14="http://schemas.microsoft.com/office/drawing/2010/main" xmlns="" w="9525">
+              <a14:hiddenLine xmlns="" xmlns:a14="http://schemas.microsoft.com/office/drawing/2010/main" w="9525">
                 <a:solidFill>
                   <a:srgbClr val="000000"/>
                 </a:solidFill>
@@ -27441,14 +27571,14 @@
           </a:ln>
           <a:extLst>
             <a:ext uri="{909E8E84-426E-40dd-AFC4-6F175D3DCCD1}">
-              <a14:hiddenFill xmlns:a14="http://schemas.microsoft.com/office/drawing/2010/main" xmlns="">
+              <a14:hiddenFill xmlns="" xmlns:a14="http://schemas.microsoft.com/office/drawing/2010/main">
                 <a:solidFill>
                   <a:srgbClr val="FFFFFF"/>
                 </a:solidFill>
               </a14:hiddenFill>
             </a:ext>
             <a:ext uri="{91240B29-F687-4f45-9708-019B960494DF}">
-              <a14:hiddenLine xmlns:a14="http://schemas.microsoft.com/office/drawing/2010/main" xmlns="" w="9525">
+              <a14:hiddenLine xmlns="" xmlns:a14="http://schemas.microsoft.com/office/drawing/2010/main" w="9525">
                 <a:solidFill>
                   <a:srgbClr val="000000"/>
                 </a:solidFill>
@@ -27636,14 +27766,14 @@
             </a:ln>
             <a:extLst>
               <a:ext uri="{909E8E84-426E-40dd-AFC4-6F175D3DCCD1}">
-                <a14:hiddenFill xmlns:a14="http://schemas.microsoft.com/office/drawing/2010/main" xmlns="">
+                <a14:hiddenFill xmlns="" xmlns:a14="http://schemas.microsoft.com/office/drawing/2010/main">
                   <a:solidFill>
                     <a:srgbClr val="FFFFFF"/>
                   </a:solidFill>
                 </a14:hiddenFill>
               </a:ext>
               <a:ext uri="{91240B29-F687-4f45-9708-019B960494DF}">
-                <a14:hiddenLine xmlns:a14="http://schemas.microsoft.com/office/drawing/2010/main" xmlns="" w="9525">
+                <a14:hiddenLine xmlns="" xmlns:a14="http://schemas.microsoft.com/office/drawing/2010/main" w="9525">
                   <a:solidFill>
                     <a:srgbClr val="000000"/>
                   </a:solidFill>
@@ -27744,7 +27874,7 @@
             <a:effectLst/>
             <a:extLst>
               <a:ext uri="{91240B29-F687-4f45-9708-019B960494DF}">
-                <a14:hiddenLine xmlns:a14="http://schemas.microsoft.com/office/drawing/2010/main" xmlns="" w="9525" cap="flat" cmpd="sng">
+                <a14:hiddenLine xmlns="" xmlns:a14="http://schemas.microsoft.com/office/drawing/2010/main" w="9525" cap="flat" cmpd="sng">
                   <a:solidFill>
                     <a:schemeClr val="tx1"/>
                   </a:solidFill>
@@ -27755,7 +27885,7 @@
                 </a14:hiddenLine>
               </a:ext>
               <a:ext uri="{AF507438-7753-43e0-B8FC-AC1667EBCBE1}">
-                <a14:hiddenEffects xmlns:a14="http://schemas.microsoft.com/office/drawing/2010/main" xmlns="">
+                <a14:hiddenEffects xmlns="" xmlns:a14="http://schemas.microsoft.com/office/drawing/2010/main">
                   <a:effectLst>
                     <a:outerShdw dist="35921" dir="2700000" algn="ctr" rotWithShape="0">
                       <a:schemeClr val="bg2"/>
@@ -27841,14 +27971,14 @@
               </a:ln>
               <a:extLst>
                 <a:ext uri="{909E8E84-426E-40dd-AFC4-6F175D3DCCD1}">
-                  <a14:hiddenFill xmlns:a14="http://schemas.microsoft.com/office/drawing/2010/main" xmlns="">
+                  <a14:hiddenFill xmlns="" xmlns:a14="http://schemas.microsoft.com/office/drawing/2010/main">
                     <a:solidFill>
                       <a:srgbClr val="FFFFFF"/>
                     </a:solidFill>
                   </a14:hiddenFill>
                 </a:ext>
                 <a:ext uri="{91240B29-F687-4f45-9708-019B960494DF}">
-                  <a14:hiddenLine xmlns:a14="http://schemas.microsoft.com/office/drawing/2010/main" xmlns="" w="9525">
+                  <a14:hiddenLine xmlns="" xmlns:a14="http://schemas.microsoft.com/office/drawing/2010/main" w="9525">
                     <a:solidFill>
                       <a:srgbClr val="000000"/>
                     </a:solidFill>
@@ -27949,7 +28079,7 @@
               <a:effectLst/>
               <a:extLst>
                 <a:ext uri="{91240B29-F687-4f45-9708-019B960494DF}">
-                  <a14:hiddenLine xmlns:a14="http://schemas.microsoft.com/office/drawing/2010/main" xmlns="" w="9525" cap="flat" cmpd="sng">
+                  <a14:hiddenLine xmlns="" xmlns:a14="http://schemas.microsoft.com/office/drawing/2010/main" w="9525" cap="flat" cmpd="sng">
                     <a:solidFill>
                       <a:schemeClr val="tx1"/>
                     </a:solidFill>
@@ -27960,7 +28090,7 @@
                   </a14:hiddenLine>
                 </a:ext>
                 <a:ext uri="{AF507438-7753-43e0-B8FC-AC1667EBCBE1}">
-                  <a14:hiddenEffects xmlns:a14="http://schemas.microsoft.com/office/drawing/2010/main" xmlns="">
+                  <a14:hiddenEffects xmlns="" xmlns:a14="http://schemas.microsoft.com/office/drawing/2010/main">
                     <a:effectLst>
                       <a:outerShdw dist="35921" dir="2700000" algn="ctr" rotWithShape="0">
                         <a:schemeClr val="bg2"/>
@@ -28022,7 +28152,7 @@
               </a:ln>
               <a:extLst>
                 <a:ext uri="{909E8E84-426E-40dd-AFC4-6F175D3DCCD1}">
-                  <a14:hiddenFill xmlns:a14="http://schemas.microsoft.com/office/drawing/2010/main" xmlns="">
+                  <a14:hiddenFill xmlns="" xmlns:a14="http://schemas.microsoft.com/office/drawing/2010/main">
                     <a:noFill/>
                   </a14:hiddenFill>
                 </a:ext>
@@ -28130,7 +28260,7 @@
                 </a:ln>
                 <a:extLst>
                   <a:ext uri="{91240B29-F687-4f45-9708-019B960494DF}">
-                    <a14:hiddenLine xmlns:a14="http://schemas.microsoft.com/office/drawing/2010/main" xmlns="" w="12700">
+                    <a14:hiddenLine xmlns="" xmlns:a14="http://schemas.microsoft.com/office/drawing/2010/main" w="12700">
                       <a:solidFill>
                         <a:srgbClr val="000000"/>
                       </a:solidFill>
@@ -28288,14 +28418,14 @@
                   <a:effectLst/>
                   <a:extLst>
                     <a:ext uri="{909E8E84-426E-40dd-AFC4-6F175D3DCCD1}">
-                      <a14:hiddenFill xmlns:a14="http://schemas.microsoft.com/office/drawing/2010/main" xmlns="">
+                      <a14:hiddenFill xmlns="" xmlns:a14="http://schemas.microsoft.com/office/drawing/2010/main">
                         <a:solidFill>
                           <a:schemeClr val="accent1"/>
                         </a:solidFill>
                       </a14:hiddenFill>
                     </a:ext>
                     <a:ext uri="{AF507438-7753-43e0-B8FC-AC1667EBCBE1}">
-                      <a14:hiddenEffects xmlns:a14="http://schemas.microsoft.com/office/drawing/2010/main" xmlns="">
+                      <a14:hiddenEffects xmlns="" xmlns:a14="http://schemas.microsoft.com/office/drawing/2010/main">
                         <a:effectLst>
                           <a:outerShdw dist="35921" dir="2700000" algn="ctr" rotWithShape="0">
                             <a:schemeClr val="bg2"/>
@@ -28387,14 +28517,14 @@
                   <a:effectLst/>
                   <a:extLst>
                     <a:ext uri="{909E8E84-426E-40dd-AFC4-6F175D3DCCD1}">
-                      <a14:hiddenFill xmlns:a14="http://schemas.microsoft.com/office/drawing/2010/main" xmlns="">
+                      <a14:hiddenFill xmlns="" xmlns:a14="http://schemas.microsoft.com/office/drawing/2010/main">
                         <a:solidFill>
                           <a:schemeClr val="accent1"/>
                         </a:solidFill>
                       </a14:hiddenFill>
                     </a:ext>
                     <a:ext uri="{AF507438-7753-43e0-B8FC-AC1667EBCBE1}">
-                      <a14:hiddenEffects xmlns:a14="http://schemas.microsoft.com/office/drawing/2010/main" xmlns="">
+                      <a14:hiddenEffects xmlns="" xmlns:a14="http://schemas.microsoft.com/office/drawing/2010/main">
                         <a:effectLst>
                           <a:outerShdw dist="35921" dir="2700000" algn="ctr" rotWithShape="0">
                             <a:schemeClr val="bg2"/>
@@ -28441,12 +28571,12 @@
                 <a:effectLst/>
                 <a:extLst>
                   <a:ext uri="{909E8E84-426E-40dd-AFC4-6F175D3DCCD1}">
-                    <a14:hiddenFill xmlns:a14="http://schemas.microsoft.com/office/drawing/2010/main" xmlns="">
+                    <a14:hiddenFill xmlns="" xmlns:a14="http://schemas.microsoft.com/office/drawing/2010/main">
                       <a:noFill/>
                     </a14:hiddenFill>
                   </a:ext>
                   <a:ext uri="{AF507438-7753-43e0-B8FC-AC1667EBCBE1}">
-                    <a14:hiddenEffects xmlns:a14="http://schemas.microsoft.com/office/drawing/2010/main" xmlns="">
+                    <a14:hiddenEffects xmlns="" xmlns:a14="http://schemas.microsoft.com/office/drawing/2010/main">
                       <a:effectLst>
                         <a:outerShdw blurRad="63500" dist="38099" dir="2700000" algn="ctr" rotWithShape="0">
                           <a:schemeClr val="bg2">
@@ -28499,12 +28629,12 @@
                 <a:effectLst/>
                 <a:extLst>
                   <a:ext uri="{909E8E84-426E-40dd-AFC4-6F175D3DCCD1}">
-                    <a14:hiddenFill xmlns:a14="http://schemas.microsoft.com/office/drawing/2010/main" xmlns="">
+                    <a14:hiddenFill xmlns="" xmlns:a14="http://schemas.microsoft.com/office/drawing/2010/main">
                       <a:noFill/>
                     </a14:hiddenFill>
                   </a:ext>
                   <a:ext uri="{AF507438-7753-43e0-B8FC-AC1667EBCBE1}">
-                    <a14:hiddenEffects xmlns:a14="http://schemas.microsoft.com/office/drawing/2010/main" xmlns="">
+                    <a14:hiddenEffects xmlns="" xmlns:a14="http://schemas.microsoft.com/office/drawing/2010/main">
                       <a:effectLst>
                         <a:outerShdw blurRad="63500" dist="38099" dir="2700000" algn="ctr" rotWithShape="0">
                           <a:schemeClr val="bg2">
@@ -28626,7 +28756,7 @@
             </a:ln>
             <a:extLst>
               <a:ext uri="{91240B29-F687-4f45-9708-019B960494DF}">
-                <a14:hiddenLine xmlns:a14="http://schemas.microsoft.com/office/drawing/2010/main" xmlns="" w="12700">
+                <a14:hiddenLine xmlns="" xmlns:a14="http://schemas.microsoft.com/office/drawing/2010/main" w="12700">
                   <a:solidFill>
                     <a:srgbClr val="000000"/>
                   </a:solidFill>
@@ -28784,14 +28914,14 @@
               <a:effectLst/>
               <a:extLst>
                 <a:ext uri="{909E8E84-426E-40dd-AFC4-6F175D3DCCD1}">
-                  <a14:hiddenFill xmlns:a14="http://schemas.microsoft.com/office/drawing/2010/main" xmlns="">
+                  <a14:hiddenFill xmlns="" xmlns:a14="http://schemas.microsoft.com/office/drawing/2010/main">
                     <a:solidFill>
                       <a:schemeClr val="accent1"/>
                     </a:solidFill>
                   </a14:hiddenFill>
                 </a:ext>
                 <a:ext uri="{AF507438-7753-43e0-B8FC-AC1667EBCBE1}">
-                  <a14:hiddenEffects xmlns:a14="http://schemas.microsoft.com/office/drawing/2010/main" xmlns="">
+                  <a14:hiddenEffects xmlns="" xmlns:a14="http://schemas.microsoft.com/office/drawing/2010/main">
                     <a:effectLst>
                       <a:outerShdw dist="35921" dir="2700000" algn="ctr" rotWithShape="0">
                         <a:schemeClr val="bg2"/>
@@ -28883,14 +29013,14 @@
               <a:effectLst/>
               <a:extLst>
                 <a:ext uri="{909E8E84-426E-40dd-AFC4-6F175D3DCCD1}">
-                  <a14:hiddenFill xmlns:a14="http://schemas.microsoft.com/office/drawing/2010/main" xmlns="">
+                  <a14:hiddenFill xmlns="" xmlns:a14="http://schemas.microsoft.com/office/drawing/2010/main">
                     <a:solidFill>
                       <a:schemeClr val="accent1"/>
                     </a:solidFill>
                   </a14:hiddenFill>
                 </a:ext>
                 <a:ext uri="{AF507438-7753-43e0-B8FC-AC1667EBCBE1}">
-                  <a14:hiddenEffects xmlns:a14="http://schemas.microsoft.com/office/drawing/2010/main" xmlns="">
+                  <a14:hiddenEffects xmlns="" xmlns:a14="http://schemas.microsoft.com/office/drawing/2010/main">
                     <a:effectLst>
                       <a:outerShdw dist="35921" dir="2700000" algn="ctr" rotWithShape="0">
                         <a:schemeClr val="bg2"/>
@@ -28937,12 +29067,12 @@
             <a:effectLst/>
             <a:extLst>
               <a:ext uri="{909E8E84-426E-40dd-AFC4-6F175D3DCCD1}">
-                <a14:hiddenFill xmlns:a14="http://schemas.microsoft.com/office/drawing/2010/main" xmlns="">
+                <a14:hiddenFill xmlns="" xmlns:a14="http://schemas.microsoft.com/office/drawing/2010/main">
                   <a:noFill/>
                 </a14:hiddenFill>
               </a:ext>
               <a:ext uri="{AF507438-7753-43e0-B8FC-AC1667EBCBE1}">
-                <a14:hiddenEffects xmlns:a14="http://schemas.microsoft.com/office/drawing/2010/main" xmlns="">
+                <a14:hiddenEffects xmlns="" xmlns:a14="http://schemas.microsoft.com/office/drawing/2010/main">
                   <a:effectLst>
                     <a:outerShdw blurRad="63500" dist="38099" dir="2700000" algn="ctr" rotWithShape="0">
                       <a:schemeClr val="bg2">
@@ -28995,12 +29125,12 @@
             <a:effectLst/>
             <a:extLst>
               <a:ext uri="{909E8E84-426E-40dd-AFC4-6F175D3DCCD1}">
-                <a14:hiddenFill xmlns:a14="http://schemas.microsoft.com/office/drawing/2010/main" xmlns="">
+                <a14:hiddenFill xmlns="" xmlns:a14="http://schemas.microsoft.com/office/drawing/2010/main">
                   <a:noFill/>
                 </a14:hiddenFill>
               </a:ext>
               <a:ext uri="{AF507438-7753-43e0-B8FC-AC1667EBCBE1}">
-                <a14:hiddenEffects xmlns:a14="http://schemas.microsoft.com/office/drawing/2010/main" xmlns="">
+                <a14:hiddenEffects xmlns="" xmlns:a14="http://schemas.microsoft.com/office/drawing/2010/main">
                   <a:effectLst>
                     <a:outerShdw blurRad="63500" dist="38099" dir="2700000" algn="ctr" rotWithShape="0">
                       <a:schemeClr val="bg2">
@@ -29202,21 +29332,13 @@
           <a:p>
             <a:r>
               <a:rPr lang="en-US" dirty="0" smtClean="0"/>
-              <a:t>S</a:t>
-            </a:r>
+              <a:t>Security via IPsec tunnels</a:t>
+            </a:r>
+          </a:p>
+          <a:p>
             <a:r>
               <a:rPr lang="en-US" dirty="0" smtClean="0"/>
-              <a:t>ecurity via IPsec tunnels</a:t>
-            </a:r>
-          </a:p>
-          <a:p>
-            <a:r>
-              <a:rPr lang="en-US" dirty="0" smtClean="0"/>
-              <a:t>S</a:t>
-            </a:r>
-            <a:r>
-              <a:rPr lang="en-US" dirty="0" smtClean="0"/>
-              <a:t>implified network operation: ISP can do the routing for you</a:t>
+              <a:t>Simplified network operation: ISP can do the routing for you</a:t>
             </a:r>
           </a:p>
           <a:p>
@@ -29319,7 +29441,159 @@
   <p:timing>
     <p:tnLst>
       <p:par>
-        <p:cTn id="1" dur="indefinite" restart="never" nodeType="tmRoot"/>
+        <p:cTn id="1" dur="indefinite" restart="never" nodeType="tmRoot">
+          <p:childTnLst>
+            <p:seq concurrent="1" nextAc="seek">
+              <p:cTn id="2" dur="indefinite" nodeType="mainSeq">
+                <p:childTnLst>
+                  <p:par>
+                    <p:cTn id="3" fill="hold">
+                      <p:stCondLst>
+                        <p:cond delay="indefinite"/>
+                      </p:stCondLst>
+                      <p:childTnLst>
+                        <p:par>
+                          <p:cTn id="4" fill="hold">
+                            <p:stCondLst>
+                              <p:cond delay="0"/>
+                            </p:stCondLst>
+                            <p:childTnLst>
+                              <p:par>
+                                <p:cTn id="5" presetID="1" presetClass="entr" presetSubtype="0" fill="hold" nodeType="clickEffect">
+                                  <p:stCondLst>
+                                    <p:cond delay="0"/>
+                                  </p:stCondLst>
+                                  <p:childTnLst>
+                                    <p:set>
+                                      <p:cBhvr>
+                                        <p:cTn id="6" dur="1" fill="hold">
+                                          <p:stCondLst>
+                                            <p:cond delay="0"/>
+                                          </p:stCondLst>
+                                        </p:cTn>
+                                        <p:tgtEl>
+                                          <p:spTgt spid="297987">
+                                            <p:txEl>
+                                              <p:pRg st="2" end="2"/>
+                                            </p:txEl>
+                                          </p:spTgt>
+                                        </p:tgtEl>
+                                        <p:attrNameLst>
+                                          <p:attrName>style.visibility</p:attrName>
+                                        </p:attrNameLst>
+                                      </p:cBhvr>
+                                      <p:to>
+                                        <p:strVal val="visible"/>
+                                      </p:to>
+                                    </p:set>
+                                  </p:childTnLst>
+                                </p:cTn>
+                              </p:par>
+                            </p:childTnLst>
+                          </p:cTn>
+                        </p:par>
+                      </p:childTnLst>
+                    </p:cTn>
+                  </p:par>
+                  <p:par>
+                    <p:cTn id="7" fill="hold">
+                      <p:stCondLst>
+                        <p:cond delay="indefinite"/>
+                      </p:stCondLst>
+                      <p:childTnLst>
+                        <p:par>
+                          <p:cTn id="8" fill="hold">
+                            <p:stCondLst>
+                              <p:cond delay="0"/>
+                            </p:stCondLst>
+                            <p:childTnLst>
+                              <p:par>
+                                <p:cTn id="9" presetID="1" presetClass="entr" presetSubtype="0" fill="hold" nodeType="clickEffect">
+                                  <p:stCondLst>
+                                    <p:cond delay="0"/>
+                                  </p:stCondLst>
+                                  <p:childTnLst>
+                                    <p:set>
+                                      <p:cBhvr>
+                                        <p:cTn id="10" dur="1" fill="hold">
+                                          <p:stCondLst>
+                                            <p:cond delay="0"/>
+                                          </p:stCondLst>
+                                        </p:cTn>
+                                        <p:tgtEl>
+                                          <p:spTgt spid="297987">
+                                            <p:txEl>
+                                              <p:pRg st="3" end="3"/>
+                                            </p:txEl>
+                                          </p:spTgt>
+                                        </p:tgtEl>
+                                        <p:attrNameLst>
+                                          <p:attrName>style.visibility</p:attrName>
+                                        </p:attrNameLst>
+                                      </p:cBhvr>
+                                      <p:to>
+                                        <p:strVal val="visible"/>
+                                      </p:to>
+                                    </p:set>
+                                  </p:childTnLst>
+                                </p:cTn>
+                              </p:par>
+                              <p:par>
+                                <p:cTn id="11" presetID="1" presetClass="entr" presetSubtype="0" fill="hold" nodeType="withEffect">
+                                  <p:stCondLst>
+                                    <p:cond delay="0"/>
+                                  </p:stCondLst>
+                                  <p:childTnLst>
+                                    <p:set>
+                                      <p:cBhvr>
+                                        <p:cTn id="12" dur="1" fill="hold">
+                                          <p:stCondLst>
+                                            <p:cond delay="0"/>
+                                          </p:stCondLst>
+                                        </p:cTn>
+                                        <p:tgtEl>
+                                          <p:spTgt spid="297987">
+                                            <p:txEl>
+                                              <p:pRg st="4" end="4"/>
+                                            </p:txEl>
+                                          </p:spTgt>
+                                        </p:tgtEl>
+                                        <p:attrNameLst>
+                                          <p:attrName>style.visibility</p:attrName>
+                                        </p:attrNameLst>
+                                      </p:cBhvr>
+                                      <p:to>
+                                        <p:strVal val="visible"/>
+                                      </p:to>
+                                    </p:set>
+                                  </p:childTnLst>
+                                </p:cTn>
+                              </p:par>
+                            </p:childTnLst>
+                          </p:cTn>
+                        </p:par>
+                      </p:childTnLst>
+                    </p:cTn>
+                  </p:par>
+                </p:childTnLst>
+              </p:cTn>
+              <p:prevCondLst>
+                <p:cond evt="onPrev" delay="0">
+                  <p:tgtEl>
+                    <p:sldTgt/>
+                  </p:tgtEl>
+                </p:cond>
+              </p:prevCondLst>
+              <p:nextCondLst>
+                <p:cond evt="onNext" delay="0">
+                  <p:tgtEl>
+                    <p:sldTgt/>
+                  </p:tgtEl>
+                </p:cond>
+              </p:nextCondLst>
+            </p:seq>
+          </p:childTnLst>
+        </p:cTn>
       </p:par>
     </p:tnLst>
   </p:timing>
@@ -31611,7 +31885,252 @@
   <p:timing>
     <p:tnLst>
       <p:par>
-        <p:cTn id="1" dur="indefinite" restart="never" nodeType="tmRoot"/>
+        <p:cTn id="1" dur="indefinite" restart="never" nodeType="tmRoot">
+          <p:childTnLst>
+            <p:seq concurrent="1" nextAc="seek">
+              <p:cTn id="2" dur="indefinite" nodeType="mainSeq">
+                <p:childTnLst>
+                  <p:par>
+                    <p:cTn id="3" fill="hold">
+                      <p:stCondLst>
+                        <p:cond delay="indefinite"/>
+                      </p:stCondLst>
+                      <p:childTnLst>
+                        <p:par>
+                          <p:cTn id="4" fill="hold">
+                            <p:stCondLst>
+                              <p:cond delay="0"/>
+                            </p:stCondLst>
+                            <p:childTnLst>
+                              <p:par>
+                                <p:cTn id="5" presetID="1" presetClass="entr" presetSubtype="0" fill="hold" nodeType="clickEffect">
+                                  <p:stCondLst>
+                                    <p:cond delay="0"/>
+                                  </p:stCondLst>
+                                  <p:childTnLst>
+                                    <p:set>
+                                      <p:cBhvr>
+                                        <p:cTn id="6" dur="1" fill="hold">
+                                          <p:stCondLst>
+                                            <p:cond delay="0"/>
+                                          </p:stCondLst>
+                                        </p:cTn>
+                                        <p:tgtEl>
+                                          <p:spTgt spid="17411">
+                                            <p:txEl>
+                                              <p:pRg st="3" end="3"/>
+                                            </p:txEl>
+                                          </p:spTgt>
+                                        </p:tgtEl>
+                                        <p:attrNameLst>
+                                          <p:attrName>style.visibility</p:attrName>
+                                        </p:attrNameLst>
+                                      </p:cBhvr>
+                                      <p:to>
+                                        <p:strVal val="visible"/>
+                                      </p:to>
+                                    </p:set>
+                                  </p:childTnLst>
+                                </p:cTn>
+                              </p:par>
+                              <p:par>
+                                <p:cTn id="7" presetID="1" presetClass="entr" presetSubtype="0" fill="hold" nodeType="withEffect">
+                                  <p:stCondLst>
+                                    <p:cond delay="0"/>
+                                  </p:stCondLst>
+                                  <p:childTnLst>
+                                    <p:set>
+                                      <p:cBhvr>
+                                        <p:cTn id="8" dur="1" fill="hold">
+                                          <p:stCondLst>
+                                            <p:cond delay="0"/>
+                                          </p:stCondLst>
+                                        </p:cTn>
+                                        <p:tgtEl>
+                                          <p:spTgt spid="17411">
+                                            <p:txEl>
+                                              <p:pRg st="4" end="4"/>
+                                            </p:txEl>
+                                          </p:spTgt>
+                                        </p:tgtEl>
+                                        <p:attrNameLst>
+                                          <p:attrName>style.visibility</p:attrName>
+                                        </p:attrNameLst>
+                                      </p:cBhvr>
+                                      <p:to>
+                                        <p:strVal val="visible"/>
+                                      </p:to>
+                                    </p:set>
+                                  </p:childTnLst>
+                                </p:cTn>
+                              </p:par>
+                              <p:par>
+                                <p:cTn id="9" presetID="1" presetClass="entr" presetSubtype="0" fill="hold" nodeType="withEffect">
+                                  <p:stCondLst>
+                                    <p:cond delay="0"/>
+                                  </p:stCondLst>
+                                  <p:childTnLst>
+                                    <p:set>
+                                      <p:cBhvr>
+                                        <p:cTn id="10" dur="1" fill="hold">
+                                          <p:stCondLst>
+                                            <p:cond delay="0"/>
+                                          </p:stCondLst>
+                                        </p:cTn>
+                                        <p:tgtEl>
+                                          <p:spTgt spid="17411">
+                                            <p:txEl>
+                                              <p:pRg st="5" end="5"/>
+                                            </p:txEl>
+                                          </p:spTgt>
+                                        </p:tgtEl>
+                                        <p:attrNameLst>
+                                          <p:attrName>style.visibility</p:attrName>
+                                        </p:attrNameLst>
+                                      </p:cBhvr>
+                                      <p:to>
+                                        <p:strVal val="visible"/>
+                                      </p:to>
+                                    </p:set>
+                                  </p:childTnLst>
+                                </p:cTn>
+                              </p:par>
+                              <p:par>
+                                <p:cTn id="11" presetID="1" presetClass="entr" presetSubtype="0" fill="hold" nodeType="withEffect">
+                                  <p:stCondLst>
+                                    <p:cond delay="0"/>
+                                  </p:stCondLst>
+                                  <p:childTnLst>
+                                    <p:set>
+                                      <p:cBhvr>
+                                        <p:cTn id="12" dur="1" fill="hold">
+                                          <p:stCondLst>
+                                            <p:cond delay="0"/>
+                                          </p:stCondLst>
+                                        </p:cTn>
+                                        <p:tgtEl>
+                                          <p:spTgt spid="17411">
+                                            <p:txEl>
+                                              <p:pRg st="6" end="6"/>
+                                            </p:txEl>
+                                          </p:spTgt>
+                                        </p:tgtEl>
+                                        <p:attrNameLst>
+                                          <p:attrName>style.visibility</p:attrName>
+                                        </p:attrNameLst>
+                                      </p:cBhvr>
+                                      <p:to>
+                                        <p:strVal val="visible"/>
+                                      </p:to>
+                                    </p:set>
+                                  </p:childTnLst>
+                                </p:cTn>
+                              </p:par>
+                            </p:childTnLst>
+                          </p:cTn>
+                        </p:par>
+                      </p:childTnLst>
+                    </p:cTn>
+                  </p:par>
+                  <p:par>
+                    <p:cTn id="13" fill="hold">
+                      <p:stCondLst>
+                        <p:cond delay="indefinite"/>
+                      </p:stCondLst>
+                      <p:childTnLst>
+                        <p:par>
+                          <p:cTn id="14" fill="hold">
+                            <p:stCondLst>
+                              <p:cond delay="0"/>
+                            </p:stCondLst>
+                            <p:childTnLst>
+                              <p:par>
+                                <p:cTn id="15" presetID="1" presetClass="entr" presetSubtype="0" fill="hold" nodeType="clickEffect">
+                                  <p:stCondLst>
+                                    <p:cond delay="0"/>
+                                  </p:stCondLst>
+                                  <p:childTnLst>
+                                    <p:set>
+                                      <p:cBhvr>
+                                        <p:cTn id="16" dur="1" fill="hold">
+                                          <p:stCondLst>
+                                            <p:cond delay="0"/>
+                                          </p:stCondLst>
+                                        </p:cTn>
+                                        <p:tgtEl>
+                                          <p:spTgt spid="17411">
+                                            <p:txEl>
+                                              <p:pRg st="7" end="7"/>
+                                            </p:txEl>
+                                          </p:spTgt>
+                                        </p:tgtEl>
+                                        <p:attrNameLst>
+                                          <p:attrName>style.visibility</p:attrName>
+                                        </p:attrNameLst>
+                                      </p:cBhvr>
+                                      <p:to>
+                                        <p:strVal val="visible"/>
+                                      </p:to>
+                                    </p:set>
+                                  </p:childTnLst>
+                                </p:cTn>
+                              </p:par>
+                              <p:par>
+                                <p:cTn id="17" presetID="1" presetClass="entr" presetSubtype="0" fill="hold" nodeType="withEffect">
+                                  <p:stCondLst>
+                                    <p:cond delay="0"/>
+                                  </p:stCondLst>
+                                  <p:childTnLst>
+                                    <p:set>
+                                      <p:cBhvr>
+                                        <p:cTn id="18" dur="1" fill="hold">
+                                          <p:stCondLst>
+                                            <p:cond delay="0"/>
+                                          </p:stCondLst>
+                                        </p:cTn>
+                                        <p:tgtEl>
+                                          <p:spTgt spid="17411">
+                                            <p:txEl>
+                                              <p:pRg st="8" end="8"/>
+                                            </p:txEl>
+                                          </p:spTgt>
+                                        </p:tgtEl>
+                                        <p:attrNameLst>
+                                          <p:attrName>style.visibility</p:attrName>
+                                        </p:attrNameLst>
+                                      </p:cBhvr>
+                                      <p:to>
+                                        <p:strVal val="visible"/>
+                                      </p:to>
+                                    </p:set>
+                                  </p:childTnLst>
+                                </p:cTn>
+                              </p:par>
+                            </p:childTnLst>
+                          </p:cTn>
+                        </p:par>
+                      </p:childTnLst>
+                    </p:cTn>
+                  </p:par>
+                </p:childTnLst>
+              </p:cTn>
+              <p:prevCondLst>
+                <p:cond evt="onPrev" delay="0">
+                  <p:tgtEl>
+                    <p:sldTgt/>
+                  </p:tgtEl>
+                </p:cond>
+              </p:prevCondLst>
+              <p:nextCondLst>
+                <p:cond evt="onNext" delay="0">
+                  <p:tgtEl>
+                    <p:sldTgt/>
+                  </p:tgtEl>
+                </p:cond>
+              </p:nextCondLst>
+            </p:seq>
+          </p:childTnLst>
+        </p:cTn>
       </p:par>
     </p:tnLst>
   </p:timing>
@@ -32203,8 +32722,27 @@
             <a:pPr lvl="1"/>
             <a:r>
               <a:rPr lang="en-US" dirty="0" smtClean="0"/>
-              <a:t>Leading to many cybercrimes</a:t>
-            </a:r>
+              <a:t>Leading to many </a:t>
+            </a:r>
+            <a:r>
+              <a:rPr lang="en-US" dirty="0" smtClean="0"/>
+              <a:t>cybercrimes</a:t>
+            </a:r>
+          </a:p>
+          <a:p>
+            <a:r>
+              <a:rPr lang="en-US" dirty="0" smtClean="0">
+                <a:solidFill>
+                  <a:srgbClr val="0000FF"/>
+                </a:solidFill>
+              </a:rPr>
+              <a:t>Not our focus</a:t>
+            </a:r>
+            <a:endParaRPr lang="en-US" dirty="0" smtClean="0">
+              <a:solidFill>
+                <a:srgbClr val="0000FF"/>
+              </a:solidFill>
+            </a:endParaRPr>
           </a:p>
         </p:txBody>
       </p:sp>
@@ -32295,7 +32833,79 @@
   <p:timing>
     <p:tnLst>
       <p:par>
-        <p:cTn id="1" dur="indefinite" restart="never" nodeType="tmRoot"/>
+        <p:cTn id="1" dur="indefinite" restart="never" nodeType="tmRoot">
+          <p:childTnLst>
+            <p:seq concurrent="1" nextAc="seek">
+              <p:cTn id="2" dur="indefinite" nodeType="mainSeq">
+                <p:childTnLst>
+                  <p:par>
+                    <p:cTn id="3" fill="hold">
+                      <p:stCondLst>
+                        <p:cond delay="indefinite"/>
+                      </p:stCondLst>
+                      <p:childTnLst>
+                        <p:par>
+                          <p:cTn id="4" fill="hold">
+                            <p:stCondLst>
+                              <p:cond delay="0"/>
+                            </p:stCondLst>
+                            <p:childTnLst>
+                              <p:par>
+                                <p:cTn id="5" presetID="1" presetClass="entr" presetSubtype="0" fill="hold" nodeType="clickEffect">
+                                  <p:stCondLst>
+                                    <p:cond delay="0"/>
+                                  </p:stCondLst>
+                                  <p:childTnLst>
+                                    <p:set>
+                                      <p:cBhvr>
+                                        <p:cTn id="6" dur="1" fill="hold">
+                                          <p:stCondLst>
+                                            <p:cond delay="0"/>
+                                          </p:stCondLst>
+                                        </p:cTn>
+                                        <p:tgtEl>
+                                          <p:spTgt spid="3">
+                                            <p:txEl>
+                                              <p:pRg st="3" end="3"/>
+                                            </p:txEl>
+                                          </p:spTgt>
+                                        </p:tgtEl>
+                                        <p:attrNameLst>
+                                          <p:attrName>style.visibility</p:attrName>
+                                        </p:attrNameLst>
+                                      </p:cBhvr>
+                                      <p:to>
+                                        <p:strVal val="visible"/>
+                                      </p:to>
+                                    </p:set>
+                                  </p:childTnLst>
+                                </p:cTn>
+                              </p:par>
+                            </p:childTnLst>
+                          </p:cTn>
+                        </p:par>
+                      </p:childTnLst>
+                    </p:cTn>
+                  </p:par>
+                </p:childTnLst>
+              </p:cTn>
+              <p:prevCondLst>
+                <p:cond evt="onPrev" delay="0">
+                  <p:tgtEl>
+                    <p:sldTgt/>
+                  </p:tgtEl>
+                </p:cond>
+              </p:prevCondLst>
+              <p:nextCondLst>
+                <p:cond evt="onNext" delay="0">
+                  <p:tgtEl>
+                    <p:sldTgt/>
+                  </p:tgtEl>
+                </p:cond>
+              </p:nextCondLst>
+            </p:seq>
+          </p:childTnLst>
+        </p:cTn>
       </p:par>
     </p:tnLst>
   </p:timing>
@@ -33705,8 +34315,17 @@
           <a:p>
             <a:r>
               <a:rPr lang="en-US" dirty="0" smtClean="0"/>
-              <a:t>Today, BGP is </a:t>
-            </a:r>
+              <a:t>Overall, </a:t>
+            </a:r>
+            <a:r>
+              <a:rPr lang="en-US" dirty="0" smtClean="0"/>
+              <a:t>BGP </a:t>
+            </a:r>
+            <a:r>
+              <a:rPr lang="en-US" dirty="0" smtClean="0"/>
+              <a:t>today is </a:t>
+            </a:r>
+            <a:endParaRPr lang="en-US" dirty="0" smtClean="0"/>
           </a:p>
           <a:p>
             <a:pPr lvl="1"/>
@@ -33819,7 +34438,350 @@
   <p:timing>
     <p:tnLst>
       <p:par>
-        <p:cTn id="1" dur="indefinite" restart="never" nodeType="tmRoot"/>
+        <p:cTn id="1" dur="indefinite" restart="never" nodeType="tmRoot">
+          <p:childTnLst>
+            <p:seq concurrent="1" nextAc="seek">
+              <p:cTn id="2" dur="indefinite" nodeType="mainSeq">
+                <p:childTnLst>
+                  <p:par>
+                    <p:cTn id="3" fill="hold">
+                      <p:stCondLst>
+                        <p:cond delay="indefinite"/>
+                      </p:stCondLst>
+                      <p:childTnLst>
+                        <p:par>
+                          <p:cTn id="4" fill="hold">
+                            <p:stCondLst>
+                              <p:cond delay="0"/>
+                            </p:stCondLst>
+                            <p:childTnLst>
+                              <p:par>
+                                <p:cTn id="5" presetID="1" presetClass="entr" presetSubtype="0" fill="hold" nodeType="clickEffect">
+                                  <p:stCondLst>
+                                    <p:cond delay="0"/>
+                                  </p:stCondLst>
+                                  <p:childTnLst>
+                                    <p:set>
+                                      <p:cBhvr>
+                                        <p:cTn id="6" dur="1" fill="hold">
+                                          <p:stCondLst>
+                                            <p:cond delay="0"/>
+                                          </p:stCondLst>
+                                        </p:cTn>
+                                        <p:tgtEl>
+                                          <p:spTgt spid="3">
+                                            <p:txEl>
+                                              <p:pRg st="0" end="0"/>
+                                            </p:txEl>
+                                          </p:spTgt>
+                                        </p:tgtEl>
+                                        <p:attrNameLst>
+                                          <p:attrName>style.visibility</p:attrName>
+                                        </p:attrNameLst>
+                                      </p:cBhvr>
+                                      <p:to>
+                                        <p:strVal val="visible"/>
+                                      </p:to>
+                                    </p:set>
+                                  </p:childTnLst>
+                                </p:cTn>
+                              </p:par>
+                            </p:childTnLst>
+                          </p:cTn>
+                        </p:par>
+                      </p:childTnLst>
+                    </p:cTn>
+                  </p:par>
+                  <p:par>
+                    <p:cTn id="7" fill="hold">
+                      <p:stCondLst>
+                        <p:cond delay="indefinite"/>
+                      </p:stCondLst>
+                      <p:childTnLst>
+                        <p:par>
+                          <p:cTn id="8" fill="hold">
+                            <p:stCondLst>
+                              <p:cond delay="0"/>
+                            </p:stCondLst>
+                            <p:childTnLst>
+                              <p:par>
+                                <p:cTn id="9" presetID="1" presetClass="entr" presetSubtype="0" fill="hold" nodeType="clickEffect">
+                                  <p:stCondLst>
+                                    <p:cond delay="0"/>
+                                  </p:stCondLst>
+                                  <p:childTnLst>
+                                    <p:set>
+                                      <p:cBhvr>
+                                        <p:cTn id="10" dur="1" fill="hold">
+                                          <p:stCondLst>
+                                            <p:cond delay="0"/>
+                                          </p:stCondLst>
+                                        </p:cTn>
+                                        <p:tgtEl>
+                                          <p:spTgt spid="3">
+                                            <p:txEl>
+                                              <p:pRg st="1" end="1"/>
+                                            </p:txEl>
+                                          </p:spTgt>
+                                        </p:tgtEl>
+                                        <p:attrNameLst>
+                                          <p:attrName>style.visibility</p:attrName>
+                                        </p:attrNameLst>
+                                      </p:cBhvr>
+                                      <p:to>
+                                        <p:strVal val="visible"/>
+                                      </p:to>
+                                    </p:set>
+                                  </p:childTnLst>
+                                </p:cTn>
+                              </p:par>
+                              <p:par>
+                                <p:cTn id="11" presetID="1" presetClass="entr" presetSubtype="0" fill="hold" nodeType="withEffect">
+                                  <p:stCondLst>
+                                    <p:cond delay="0"/>
+                                  </p:stCondLst>
+                                  <p:childTnLst>
+                                    <p:set>
+                                      <p:cBhvr>
+                                        <p:cTn id="12" dur="1" fill="hold">
+                                          <p:stCondLst>
+                                            <p:cond delay="0"/>
+                                          </p:stCondLst>
+                                        </p:cTn>
+                                        <p:tgtEl>
+                                          <p:spTgt spid="3">
+                                            <p:txEl>
+                                              <p:pRg st="2" end="2"/>
+                                            </p:txEl>
+                                          </p:spTgt>
+                                        </p:tgtEl>
+                                        <p:attrNameLst>
+                                          <p:attrName>style.visibility</p:attrName>
+                                        </p:attrNameLst>
+                                      </p:cBhvr>
+                                      <p:to>
+                                        <p:strVal val="visible"/>
+                                      </p:to>
+                                    </p:set>
+                                  </p:childTnLst>
+                                </p:cTn>
+                              </p:par>
+                            </p:childTnLst>
+                          </p:cTn>
+                        </p:par>
+                      </p:childTnLst>
+                    </p:cTn>
+                  </p:par>
+                  <p:par>
+                    <p:cTn id="13" fill="hold">
+                      <p:stCondLst>
+                        <p:cond delay="indefinite"/>
+                      </p:stCondLst>
+                      <p:childTnLst>
+                        <p:par>
+                          <p:cTn id="14" fill="hold">
+                            <p:stCondLst>
+                              <p:cond delay="0"/>
+                            </p:stCondLst>
+                            <p:childTnLst>
+                              <p:par>
+                                <p:cTn id="15" presetID="1" presetClass="entr" presetSubtype="0" fill="hold" nodeType="clickEffect">
+                                  <p:stCondLst>
+                                    <p:cond delay="0"/>
+                                  </p:stCondLst>
+                                  <p:childTnLst>
+                                    <p:set>
+                                      <p:cBhvr>
+                                        <p:cTn id="16" dur="1" fill="hold">
+                                          <p:stCondLst>
+                                            <p:cond delay="0"/>
+                                          </p:stCondLst>
+                                        </p:cTn>
+                                        <p:tgtEl>
+                                          <p:spTgt spid="3">
+                                            <p:txEl>
+                                              <p:pRg st="3" end="3"/>
+                                            </p:txEl>
+                                          </p:spTgt>
+                                        </p:tgtEl>
+                                        <p:attrNameLst>
+                                          <p:attrName>style.visibility</p:attrName>
+                                        </p:attrNameLst>
+                                      </p:cBhvr>
+                                      <p:to>
+                                        <p:strVal val="visible"/>
+                                      </p:to>
+                                    </p:set>
+                                  </p:childTnLst>
+                                </p:cTn>
+                              </p:par>
+                              <p:par>
+                                <p:cTn id="17" presetID="1" presetClass="entr" presetSubtype="0" fill="hold" nodeType="withEffect">
+                                  <p:stCondLst>
+                                    <p:cond delay="0"/>
+                                  </p:stCondLst>
+                                  <p:childTnLst>
+                                    <p:set>
+                                      <p:cBhvr>
+                                        <p:cTn id="18" dur="1" fill="hold">
+                                          <p:stCondLst>
+                                            <p:cond delay="0"/>
+                                          </p:stCondLst>
+                                        </p:cTn>
+                                        <p:tgtEl>
+                                          <p:spTgt spid="3">
+                                            <p:txEl>
+                                              <p:pRg st="4" end="4"/>
+                                            </p:txEl>
+                                          </p:spTgt>
+                                        </p:tgtEl>
+                                        <p:attrNameLst>
+                                          <p:attrName>style.visibility</p:attrName>
+                                        </p:attrNameLst>
+                                      </p:cBhvr>
+                                      <p:to>
+                                        <p:strVal val="visible"/>
+                                      </p:to>
+                                    </p:set>
+                                  </p:childTnLst>
+                                </p:cTn>
+                              </p:par>
+                            </p:childTnLst>
+                          </p:cTn>
+                        </p:par>
+                      </p:childTnLst>
+                    </p:cTn>
+                  </p:par>
+                  <p:par>
+                    <p:cTn id="19" fill="hold">
+                      <p:stCondLst>
+                        <p:cond delay="indefinite"/>
+                      </p:stCondLst>
+                      <p:childTnLst>
+                        <p:par>
+                          <p:cTn id="20" fill="hold">
+                            <p:stCondLst>
+                              <p:cond delay="0"/>
+                            </p:stCondLst>
+                            <p:childTnLst>
+                              <p:par>
+                                <p:cTn id="21" presetID="1" presetClass="entr" presetSubtype="0" fill="hold" nodeType="clickEffect">
+                                  <p:stCondLst>
+                                    <p:cond delay="0"/>
+                                  </p:stCondLst>
+                                  <p:childTnLst>
+                                    <p:set>
+                                      <p:cBhvr>
+                                        <p:cTn id="22" dur="1" fill="hold">
+                                          <p:stCondLst>
+                                            <p:cond delay="0"/>
+                                          </p:stCondLst>
+                                        </p:cTn>
+                                        <p:tgtEl>
+                                          <p:spTgt spid="3">
+                                            <p:txEl>
+                                              <p:pRg st="5" end="5"/>
+                                            </p:txEl>
+                                          </p:spTgt>
+                                        </p:tgtEl>
+                                        <p:attrNameLst>
+                                          <p:attrName>style.visibility</p:attrName>
+                                        </p:attrNameLst>
+                                      </p:cBhvr>
+                                      <p:to>
+                                        <p:strVal val="visible"/>
+                                      </p:to>
+                                    </p:set>
+                                  </p:childTnLst>
+                                </p:cTn>
+                              </p:par>
+                              <p:par>
+                                <p:cTn id="23" presetID="1" presetClass="entr" presetSubtype="0" fill="hold" nodeType="withEffect">
+                                  <p:stCondLst>
+                                    <p:cond delay="0"/>
+                                  </p:stCondLst>
+                                  <p:childTnLst>
+                                    <p:set>
+                                      <p:cBhvr>
+                                        <p:cTn id="24" dur="1" fill="hold">
+                                          <p:stCondLst>
+                                            <p:cond delay="0"/>
+                                          </p:stCondLst>
+                                        </p:cTn>
+                                        <p:tgtEl>
+                                          <p:spTgt spid="3">
+                                            <p:txEl>
+                                              <p:pRg st="6" end="6"/>
+                                            </p:txEl>
+                                          </p:spTgt>
+                                        </p:tgtEl>
+                                        <p:attrNameLst>
+                                          <p:attrName>style.visibility</p:attrName>
+                                        </p:attrNameLst>
+                                      </p:cBhvr>
+                                      <p:to>
+                                        <p:strVal val="visible"/>
+                                      </p:to>
+                                    </p:set>
+                                  </p:childTnLst>
+                                </p:cTn>
+                              </p:par>
+                              <p:par>
+                                <p:cTn id="25" presetID="1" presetClass="entr" presetSubtype="0" fill="hold" nodeType="withEffect">
+                                  <p:stCondLst>
+                                    <p:cond delay="0"/>
+                                  </p:stCondLst>
+                                  <p:childTnLst>
+                                    <p:set>
+                                      <p:cBhvr>
+                                        <p:cTn id="26" dur="1" fill="hold">
+                                          <p:stCondLst>
+                                            <p:cond delay="0"/>
+                                          </p:stCondLst>
+                                        </p:cTn>
+                                        <p:tgtEl>
+                                          <p:spTgt spid="3">
+                                            <p:txEl>
+                                              <p:pRg st="7" end="7"/>
+                                            </p:txEl>
+                                          </p:spTgt>
+                                        </p:tgtEl>
+                                        <p:attrNameLst>
+                                          <p:attrName>style.visibility</p:attrName>
+                                        </p:attrNameLst>
+                                      </p:cBhvr>
+                                      <p:to>
+                                        <p:strVal val="visible"/>
+                                      </p:to>
+                                    </p:set>
+                                  </p:childTnLst>
+                                </p:cTn>
+                              </p:par>
+                            </p:childTnLst>
+                          </p:cTn>
+                        </p:par>
+                      </p:childTnLst>
+                    </p:cTn>
+                  </p:par>
+                </p:childTnLst>
+              </p:cTn>
+              <p:prevCondLst>
+                <p:cond evt="onPrev" delay="0">
+                  <p:tgtEl>
+                    <p:sldTgt/>
+                  </p:tgtEl>
+                </p:cond>
+              </p:prevCondLst>
+              <p:nextCondLst>
+                <p:cond evt="onNext" delay="0">
+                  <p:tgtEl>
+                    <p:sldTgt/>
+                  </p:tgtEl>
+                </p:cond>
+              </p:nextCondLst>
+            </p:seq>
+          </p:childTnLst>
+        </p:cTn>
       </p:par>
     </p:tnLst>
   </p:timing>
@@ -35996,7 +36958,7 @@
             </a:ln>
             <a:extLst>
               <a:ext uri="{91240B29-F687-4f45-9708-019B960494DF}">
-                <a14:hiddenLine xmlns:a14="http://schemas.microsoft.com/office/drawing/2010/main" xmlns="" w="9525">
+                <a14:hiddenLine xmlns="" xmlns:a14="http://schemas.microsoft.com/office/drawing/2010/main" w="9525">
                   <a:solidFill>
                     <a:srgbClr val="000000"/>
                   </a:solidFill>
@@ -36207,7 +37169,7 @@
             </a:ln>
             <a:extLst>
               <a:ext uri="{91240B29-F687-4f45-9708-019B960494DF}">
-                <a14:hiddenLine xmlns:a14="http://schemas.microsoft.com/office/drawing/2010/main" xmlns="" w="9525">
+                <a14:hiddenLine xmlns="" xmlns:a14="http://schemas.microsoft.com/office/drawing/2010/main" w="9525">
                   <a:solidFill>
                     <a:srgbClr val="000000"/>
                   </a:solidFill>
@@ -36418,7 +37380,7 @@
             </a:ln>
             <a:extLst>
               <a:ext uri="{91240B29-F687-4f45-9708-019B960494DF}">
-                <a14:hiddenLine xmlns:a14="http://schemas.microsoft.com/office/drawing/2010/main" xmlns="" w="9525">
+                <a14:hiddenLine xmlns="" xmlns:a14="http://schemas.microsoft.com/office/drawing/2010/main" w="9525">
                   <a:solidFill>
                     <a:srgbClr val="000000"/>
                   </a:solidFill>
@@ -36629,7 +37591,7 @@
             </a:ln>
             <a:extLst>
               <a:ext uri="{91240B29-F687-4f45-9708-019B960494DF}">
-                <a14:hiddenLine xmlns:a14="http://schemas.microsoft.com/office/drawing/2010/main" xmlns="" w="9525">
+                <a14:hiddenLine xmlns="" xmlns:a14="http://schemas.microsoft.com/office/drawing/2010/main" w="9525">
                   <a:solidFill>
                     <a:srgbClr val="000000"/>
                   </a:solidFill>
@@ -36879,7 +37841,7 @@
             </a:ln>
             <a:extLst>
               <a:ext uri="{91240B29-F687-4f45-9708-019B960494DF}">
-                <a14:hiddenLine xmlns:a14="http://schemas.microsoft.com/office/drawing/2010/main" xmlns="" w="9525">
+                <a14:hiddenLine xmlns="" xmlns:a14="http://schemas.microsoft.com/office/drawing/2010/main" w="9525">
                   <a:solidFill>
                     <a:srgbClr val="000000"/>
                   </a:solidFill>
@@ -37046,14 +38008,14 @@
             </a:ln>
             <a:extLst>
               <a:ext uri="{909E8E84-426E-40dd-AFC4-6F175D3DCCD1}">
-                <a14:hiddenFill xmlns:a14="http://schemas.microsoft.com/office/drawing/2010/main" xmlns="">
+                <a14:hiddenFill xmlns="" xmlns:a14="http://schemas.microsoft.com/office/drawing/2010/main">
                   <a:solidFill>
                     <a:srgbClr val="FFFFFF"/>
                   </a:solidFill>
                 </a14:hiddenFill>
               </a:ext>
               <a:ext uri="{91240B29-F687-4f45-9708-019B960494DF}">
-                <a14:hiddenLine xmlns:a14="http://schemas.microsoft.com/office/drawing/2010/main" xmlns="" w="9525">
+                <a14:hiddenLine xmlns="" xmlns:a14="http://schemas.microsoft.com/office/drawing/2010/main" w="9525">
                   <a:solidFill>
                     <a:srgbClr val="000000"/>
                   </a:solidFill>
@@ -37225,7 +38187,7 @@
             </a:ln>
             <a:extLst>
               <a:ext uri="{909E8E84-426E-40dd-AFC4-6F175D3DCCD1}">
-                <a14:hiddenFill xmlns:a14="http://schemas.microsoft.com/office/drawing/2010/main" xmlns="">
+                <a14:hiddenFill xmlns="" xmlns:a14="http://schemas.microsoft.com/office/drawing/2010/main">
                   <a:noFill/>
                 </a14:hiddenFill>
               </a:ext>
@@ -37266,7 +38228,7 @@
             </a:ln>
             <a:extLst>
               <a:ext uri="{909E8E84-426E-40dd-AFC4-6F175D3DCCD1}">
-                <a14:hiddenFill xmlns:a14="http://schemas.microsoft.com/office/drawing/2010/main" xmlns="">
+                <a14:hiddenFill xmlns="" xmlns:a14="http://schemas.microsoft.com/office/drawing/2010/main">
                   <a:noFill/>
                 </a14:hiddenFill>
               </a:ext>
@@ -37307,7 +38269,7 @@
             </a:ln>
             <a:extLst>
               <a:ext uri="{91240B29-F687-4f45-9708-019B960494DF}">
-                <a14:hiddenLine xmlns:a14="http://schemas.microsoft.com/office/drawing/2010/main" xmlns="" w="9525">
+                <a14:hiddenLine xmlns="" xmlns:a14="http://schemas.microsoft.com/office/drawing/2010/main" w="9525">
                   <a:solidFill>
                     <a:srgbClr val="000000"/>
                   </a:solidFill>
@@ -37479,7 +38441,7 @@
             </a:ln>
             <a:extLst>
               <a:ext uri="{91240B29-F687-4f45-9708-019B960494DF}">
-                <a14:hiddenLine xmlns:a14="http://schemas.microsoft.com/office/drawing/2010/main" xmlns="" w="9525">
+                <a14:hiddenLine xmlns="" xmlns:a14="http://schemas.microsoft.com/office/drawing/2010/main" w="9525">
                   <a:solidFill>
                     <a:srgbClr val="000000"/>
                   </a:solidFill>
@@ -37729,7 +38691,7 @@
             </a:ln>
             <a:extLst>
               <a:ext uri="{91240B29-F687-4f45-9708-019B960494DF}">
-                <a14:hiddenLine xmlns:a14="http://schemas.microsoft.com/office/drawing/2010/main" xmlns="" w="9525">
+                <a14:hiddenLine xmlns="" xmlns:a14="http://schemas.microsoft.com/office/drawing/2010/main" w="9525">
                   <a:solidFill>
                     <a:srgbClr val="000000"/>
                   </a:solidFill>
@@ -37901,7 +38863,7 @@
             </a:ln>
             <a:extLst>
               <a:ext uri="{91240B29-F687-4f45-9708-019B960494DF}">
-                <a14:hiddenLine xmlns:a14="http://schemas.microsoft.com/office/drawing/2010/main" xmlns="" w="9525">
+                <a14:hiddenLine xmlns="" xmlns:a14="http://schemas.microsoft.com/office/drawing/2010/main" w="9525">
                   <a:solidFill>
                     <a:srgbClr val="000000"/>
                   </a:solidFill>
@@ -38112,7 +39074,7 @@
             </a:ln>
             <a:extLst>
               <a:ext uri="{91240B29-F687-4f45-9708-019B960494DF}">
-                <a14:hiddenLine xmlns:a14="http://schemas.microsoft.com/office/drawing/2010/main" xmlns="" w="9525">
+                <a14:hiddenLine xmlns="" xmlns:a14="http://schemas.microsoft.com/office/drawing/2010/main" w="9525">
                   <a:solidFill>
                     <a:srgbClr val="000000"/>
                   </a:solidFill>
@@ -38390,7 +39352,7 @@
           </a:ln>
           <a:extLst>
             <a:ext uri="{909E8E84-426E-40dd-AFC4-6F175D3DCCD1}">
-              <a14:hiddenFill xmlns:a14="http://schemas.microsoft.com/office/drawing/2010/main" xmlns="">
+              <a14:hiddenFill xmlns="" xmlns:a14="http://schemas.microsoft.com/office/drawing/2010/main">
                 <a:noFill/>
               </a14:hiddenFill>
             </a:ext>
@@ -38430,14 +39392,14 @@
           </a:ln>
           <a:extLst>
             <a:ext uri="{909E8E84-426E-40dd-AFC4-6F175D3DCCD1}">
-              <a14:hiddenFill xmlns:a14="http://schemas.microsoft.com/office/drawing/2010/main" xmlns="">
+              <a14:hiddenFill xmlns="" xmlns:a14="http://schemas.microsoft.com/office/drawing/2010/main">
                 <a:solidFill>
                   <a:srgbClr val="FFFFFF"/>
                 </a:solidFill>
               </a14:hiddenFill>
             </a:ext>
             <a:ext uri="{91240B29-F687-4f45-9708-019B960494DF}">
-              <a14:hiddenLine xmlns:a14="http://schemas.microsoft.com/office/drawing/2010/main" xmlns="" w="25400">
+              <a14:hiddenLine xmlns="" xmlns:a14="http://schemas.microsoft.com/office/drawing/2010/main" w="25400">
                 <a:solidFill>
                   <a:srgbClr val="000000"/>
                 </a:solidFill>
@@ -38604,14 +39566,14 @@
           </a:ln>
           <a:extLst>
             <a:ext uri="{909E8E84-426E-40dd-AFC4-6F175D3DCCD1}">
-              <a14:hiddenFill xmlns:a14="http://schemas.microsoft.com/office/drawing/2010/main" xmlns="">
+              <a14:hiddenFill xmlns="" xmlns:a14="http://schemas.microsoft.com/office/drawing/2010/main">
                 <a:solidFill>
                   <a:srgbClr val="FFFFFF"/>
                 </a:solidFill>
               </a14:hiddenFill>
             </a:ext>
             <a:ext uri="{91240B29-F687-4f45-9708-019B960494DF}">
-              <a14:hiddenLine xmlns:a14="http://schemas.microsoft.com/office/drawing/2010/main" xmlns="" w="25400">
+              <a14:hiddenLine xmlns="" xmlns:a14="http://schemas.microsoft.com/office/drawing/2010/main" w="25400">
                 <a:solidFill>
                   <a:srgbClr val="000000"/>
                 </a:solidFill>
@@ -38783,7 +39745,7 @@
           </a:ln>
           <a:extLst>
             <a:ext uri="{909E8E84-426E-40dd-AFC4-6F175D3DCCD1}">
-              <a14:hiddenFill xmlns:a14="http://schemas.microsoft.com/office/drawing/2010/main" xmlns="">
+              <a14:hiddenFill xmlns="" xmlns:a14="http://schemas.microsoft.com/office/drawing/2010/main">
                 <a:noFill/>
               </a14:hiddenFill>
             </a:ext>
@@ -38844,7 +39806,7 @@
             </a:ln>
             <a:extLst>
               <a:ext uri="{909E8E84-426E-40dd-AFC4-6F175D3DCCD1}">
-                <a14:hiddenFill xmlns:a14="http://schemas.microsoft.com/office/drawing/2010/main" xmlns="">
+                <a14:hiddenFill xmlns="" xmlns:a14="http://schemas.microsoft.com/office/drawing/2010/main">
                   <a:noFill/>
                 </a14:hiddenFill>
               </a:ext>
@@ -38884,14 +39846,14 @@
             </a:ln>
             <a:extLst>
               <a:ext uri="{909E8E84-426E-40dd-AFC4-6F175D3DCCD1}">
-                <a14:hiddenFill xmlns:a14="http://schemas.microsoft.com/office/drawing/2010/main" xmlns="">
+                <a14:hiddenFill xmlns="" xmlns:a14="http://schemas.microsoft.com/office/drawing/2010/main">
                   <a:solidFill>
                     <a:srgbClr val="FFFFFF"/>
                   </a:solidFill>
                 </a14:hiddenFill>
               </a:ext>
               <a:ext uri="{91240B29-F687-4f45-9708-019B960494DF}">
-                <a14:hiddenLine xmlns:a14="http://schemas.microsoft.com/office/drawing/2010/main" xmlns="" w="25400">
+                <a14:hiddenLine xmlns="" xmlns:a14="http://schemas.microsoft.com/office/drawing/2010/main" w="25400">
                   <a:solidFill>
                     <a:srgbClr val="000000"/>
                   </a:solidFill>
@@ -39080,7 +40042,7 @@
             </a:ln>
             <a:extLst>
               <a:ext uri="{909E8E84-426E-40dd-AFC4-6F175D3DCCD1}">
-                <a14:hiddenFill xmlns:a14="http://schemas.microsoft.com/office/drawing/2010/main" xmlns="">
+                <a14:hiddenFill xmlns="" xmlns:a14="http://schemas.microsoft.com/office/drawing/2010/main">
                   <a:noFill/>
                 </a14:hiddenFill>
               </a:ext>
@@ -39120,14 +40082,14 @@
             </a:ln>
             <a:extLst>
               <a:ext uri="{909E8E84-426E-40dd-AFC4-6F175D3DCCD1}">
-                <a14:hiddenFill xmlns:a14="http://schemas.microsoft.com/office/drawing/2010/main" xmlns="">
+                <a14:hiddenFill xmlns="" xmlns:a14="http://schemas.microsoft.com/office/drawing/2010/main">
                   <a:solidFill>
                     <a:srgbClr val="FFFFFF"/>
                   </a:solidFill>
                 </a14:hiddenFill>
               </a:ext>
               <a:ext uri="{91240B29-F687-4f45-9708-019B960494DF}">
-                <a14:hiddenLine xmlns:a14="http://schemas.microsoft.com/office/drawing/2010/main" xmlns="" w="25400">
+                <a14:hiddenLine xmlns="" xmlns:a14="http://schemas.microsoft.com/office/drawing/2010/main" w="25400">
                   <a:solidFill>
                     <a:srgbClr val="000000"/>
                   </a:solidFill>
@@ -39316,7 +40278,7 @@
             </a:ln>
             <a:extLst>
               <a:ext uri="{909E8E84-426E-40dd-AFC4-6F175D3DCCD1}">
-                <a14:hiddenFill xmlns:a14="http://schemas.microsoft.com/office/drawing/2010/main" xmlns="">
+                <a14:hiddenFill xmlns="" xmlns:a14="http://schemas.microsoft.com/office/drawing/2010/main">
                   <a:noFill/>
                 </a14:hiddenFill>
               </a:ext>
@@ -39356,14 +40318,14 @@
             </a:ln>
             <a:extLst>
               <a:ext uri="{909E8E84-426E-40dd-AFC4-6F175D3DCCD1}">
-                <a14:hiddenFill xmlns:a14="http://schemas.microsoft.com/office/drawing/2010/main" xmlns="">
+                <a14:hiddenFill xmlns="" xmlns:a14="http://schemas.microsoft.com/office/drawing/2010/main">
                   <a:solidFill>
                     <a:srgbClr val="FFFFFF"/>
                   </a:solidFill>
                 </a14:hiddenFill>
               </a:ext>
               <a:ext uri="{91240B29-F687-4f45-9708-019B960494DF}">
-                <a14:hiddenLine xmlns:a14="http://schemas.microsoft.com/office/drawing/2010/main" xmlns="" w="25400">
+                <a14:hiddenLine xmlns="" xmlns:a14="http://schemas.microsoft.com/office/drawing/2010/main" w="25400">
                   <a:solidFill>
                     <a:srgbClr val="000000"/>
                   </a:solidFill>
@@ -39531,14 +40493,14 @@
           </a:ln>
           <a:extLst>
             <a:ext uri="{909E8E84-426E-40dd-AFC4-6F175D3DCCD1}">
-              <a14:hiddenFill xmlns:a14="http://schemas.microsoft.com/office/drawing/2010/main" xmlns="">
+              <a14:hiddenFill xmlns="" xmlns:a14="http://schemas.microsoft.com/office/drawing/2010/main">
                 <a:solidFill>
                   <a:srgbClr val="FFFFFF"/>
                 </a:solidFill>
               </a14:hiddenFill>
             </a:ext>
             <a:ext uri="{91240B29-F687-4f45-9708-019B960494DF}">
-              <a14:hiddenLine xmlns:a14="http://schemas.microsoft.com/office/drawing/2010/main" xmlns="" w="12700">
+              <a14:hiddenLine xmlns="" xmlns:a14="http://schemas.microsoft.com/office/drawing/2010/main" w="12700">
                 <a:solidFill>
                   <a:srgbClr val="000000"/>
                 </a:solidFill>
@@ -39705,14 +40667,14 @@
           </a:ln>
           <a:extLst>
             <a:ext uri="{909E8E84-426E-40dd-AFC4-6F175D3DCCD1}">
-              <a14:hiddenFill xmlns:a14="http://schemas.microsoft.com/office/drawing/2010/main" xmlns="">
+              <a14:hiddenFill xmlns="" xmlns:a14="http://schemas.microsoft.com/office/drawing/2010/main">
                 <a:solidFill>
                   <a:srgbClr val="FFFFFF"/>
                 </a:solidFill>
               </a14:hiddenFill>
             </a:ext>
             <a:ext uri="{91240B29-F687-4f45-9708-019B960494DF}">
-              <a14:hiddenLine xmlns:a14="http://schemas.microsoft.com/office/drawing/2010/main" xmlns="" w="12700">
+              <a14:hiddenLine xmlns="" xmlns:a14="http://schemas.microsoft.com/office/drawing/2010/main" w="12700">
                 <a:solidFill>
                   <a:srgbClr val="000000"/>
                 </a:solidFill>
@@ -39974,7 +40936,7 @@
             </a:ln>
             <a:extLst>
               <a:ext uri="{909E8E84-426E-40dd-AFC4-6F175D3DCCD1}">
-                <a14:hiddenFill xmlns:a14="http://schemas.microsoft.com/office/drawing/2010/main" xmlns="">
+                <a14:hiddenFill xmlns="" xmlns:a14="http://schemas.microsoft.com/office/drawing/2010/main">
                   <a:noFill/>
                 </a14:hiddenFill>
               </a:ext>
@@ -40014,14 +40976,14 @@
             </a:ln>
             <a:extLst>
               <a:ext uri="{909E8E84-426E-40dd-AFC4-6F175D3DCCD1}">
-                <a14:hiddenFill xmlns:a14="http://schemas.microsoft.com/office/drawing/2010/main" xmlns="">
+                <a14:hiddenFill xmlns="" xmlns:a14="http://schemas.microsoft.com/office/drawing/2010/main">
                   <a:solidFill>
                     <a:srgbClr val="FFFFFF"/>
                   </a:solidFill>
                 </a14:hiddenFill>
               </a:ext>
               <a:ext uri="{91240B29-F687-4f45-9708-019B960494DF}">
-                <a14:hiddenLine xmlns:a14="http://schemas.microsoft.com/office/drawing/2010/main" xmlns="" w="25400">
+                <a14:hiddenLine xmlns="" xmlns:a14="http://schemas.microsoft.com/office/drawing/2010/main" w="25400">
                   <a:solidFill>
                     <a:srgbClr val="000000"/>
                   </a:solidFill>
@@ -40243,7 +41205,7 @@
             </a:ln>
             <a:extLst>
               <a:ext uri="{909E8E84-426E-40dd-AFC4-6F175D3DCCD1}">
-                <a14:hiddenFill xmlns:a14="http://schemas.microsoft.com/office/drawing/2010/main" xmlns="">
+                <a14:hiddenFill xmlns="" xmlns:a14="http://schemas.microsoft.com/office/drawing/2010/main">
                   <a:noFill/>
                 </a14:hiddenFill>
               </a:ext>
@@ -40283,14 +41245,14 @@
             </a:ln>
             <a:extLst>
               <a:ext uri="{909E8E84-426E-40dd-AFC4-6F175D3DCCD1}">
-                <a14:hiddenFill xmlns:a14="http://schemas.microsoft.com/office/drawing/2010/main" xmlns="">
+                <a14:hiddenFill xmlns="" xmlns:a14="http://schemas.microsoft.com/office/drawing/2010/main">
                   <a:solidFill>
                     <a:srgbClr val="FFFFFF"/>
                   </a:solidFill>
                 </a14:hiddenFill>
               </a:ext>
               <a:ext uri="{91240B29-F687-4f45-9708-019B960494DF}">
-                <a14:hiddenLine xmlns:a14="http://schemas.microsoft.com/office/drawing/2010/main" xmlns="" w="25400">
+                <a14:hiddenLine xmlns="" xmlns:a14="http://schemas.microsoft.com/office/drawing/2010/main" w="25400">
                   <a:solidFill>
                     <a:srgbClr val="000000"/>
                   </a:solidFill>
@@ -40828,11 +41790,7 @@
           <a:p>
             <a:r>
               <a:rPr lang="en-US" dirty="0" smtClean="0"/>
-              <a:t>TCP abrupt </a:t>
-            </a:r>
-            <a:r>
-              <a:rPr lang="en-US" dirty="0" smtClean="0"/>
-              <a:t>termination</a:t>
+              <a:t>TCP abrupt termination</a:t>
             </a:r>
             <a:endParaRPr lang="en-US" dirty="0"/>
           </a:p>
@@ -40887,11 +41845,7 @@
             <a:pPr lvl="1"/>
             <a:r>
               <a:rPr lang="en-US" sz="2000" dirty="0" smtClean="0"/>
-              <a:t>Thus, RST is not delivered reliably, and any data in flight is </a:t>
-            </a:r>
-            <a:r>
-              <a:rPr lang="en-US" sz="2000" dirty="0" smtClean="0"/>
-              <a:t>lost</a:t>
+              <a:t>Thus, RST is not delivered reliably, and any data in flight is lost</a:t>
             </a:r>
           </a:p>
           <a:p>
@@ -40909,7 +41863,23 @@
                   <a:srgbClr val="0000FF"/>
                 </a:solidFill>
               </a:rPr>
-              <a:t>who knows ports &amp; sequence numbers can disrupt any TCP connection </a:t>
+              <a:t>who knows ports </a:t>
+            </a:r>
+            <a:r>
+              <a:rPr lang="en-US" sz="2400" dirty="0" smtClean="0">
+                <a:solidFill>
+                  <a:srgbClr val="0000FF"/>
+                </a:solidFill>
+              </a:rPr>
+              <a:t>and </a:t>
+            </a:r>
+            <a:r>
+              <a:rPr lang="en-US" sz="2400" dirty="0">
+                <a:solidFill>
+                  <a:srgbClr val="0000FF"/>
+                </a:solidFill>
+              </a:rPr>
+              <a:t>sequence numbers can disrupt any TCP connection </a:t>
             </a:r>
             <a:endParaRPr lang="en-US" sz="2400" dirty="0" smtClean="0">
               <a:solidFill>
@@ -40946,7 +41916,7 @@
           </a:ln>
           <a:extLst>
             <a:ext uri="{909E8E84-426E-40dd-AFC4-6F175D3DCCD1}">
-              <a14:hiddenFill xmlns:a14="http://schemas.microsoft.com/office/drawing/2010/main" xmlns="">
+              <a14:hiddenFill xmlns="" xmlns:a14="http://schemas.microsoft.com/office/drawing/2010/main">
                 <a:noFill/>
               </a14:hiddenFill>
             </a:ext>
@@ -40987,7 +41957,7 @@
           </a:ln>
           <a:extLst>
             <a:ext uri="{909E8E84-426E-40dd-AFC4-6F175D3DCCD1}">
-              <a14:hiddenFill xmlns:a14="http://schemas.microsoft.com/office/drawing/2010/main" xmlns="">
+              <a14:hiddenFill xmlns="" xmlns:a14="http://schemas.microsoft.com/office/drawing/2010/main">
                 <a:noFill/>
               </a14:hiddenFill>
             </a:ext>
@@ -41028,7 +41998,7 @@
           </a:ln>
           <a:extLst>
             <a:ext uri="{909E8E84-426E-40dd-AFC4-6F175D3DCCD1}">
-              <a14:hiddenFill xmlns:a14="http://schemas.microsoft.com/office/drawing/2010/main" xmlns="">
+              <a14:hiddenFill xmlns="" xmlns:a14="http://schemas.microsoft.com/office/drawing/2010/main">
                 <a:noFill/>
               </a14:hiddenFill>
             </a:ext>
@@ -41069,7 +42039,7 @@
           </a:ln>
           <a:extLst>
             <a:ext uri="{909E8E84-426E-40dd-AFC4-6F175D3DCCD1}">
-              <a14:hiddenFill xmlns:a14="http://schemas.microsoft.com/office/drawing/2010/main" xmlns="">
+              <a14:hiddenFill xmlns="" xmlns:a14="http://schemas.microsoft.com/office/drawing/2010/main">
                 <a:noFill/>
               </a14:hiddenFill>
             </a:ext>
@@ -41105,14 +42075,14 @@
           </a:ln>
           <a:extLst>
             <a:ext uri="{909E8E84-426E-40dd-AFC4-6F175D3DCCD1}">
-              <a14:hiddenFill xmlns:a14="http://schemas.microsoft.com/office/drawing/2010/main" xmlns="">
+              <a14:hiddenFill xmlns="" xmlns:a14="http://schemas.microsoft.com/office/drawing/2010/main">
                 <a:solidFill>
                   <a:srgbClr val="FFFFFF"/>
                 </a:solidFill>
               </a14:hiddenFill>
             </a:ext>
             <a:ext uri="{91240B29-F687-4f45-9708-019B960494DF}">
-              <a14:hiddenLine xmlns:a14="http://schemas.microsoft.com/office/drawing/2010/main" xmlns="" w="9525">
+              <a14:hiddenLine xmlns="" xmlns:a14="http://schemas.microsoft.com/office/drawing/2010/main" w="9525">
                 <a:solidFill>
                   <a:srgbClr val="000000"/>
                 </a:solidFill>
@@ -41276,14 +42246,14 @@
           </a:ln>
           <a:extLst>
             <a:ext uri="{909E8E84-426E-40dd-AFC4-6F175D3DCCD1}">
-              <a14:hiddenFill xmlns:a14="http://schemas.microsoft.com/office/drawing/2010/main" xmlns="">
+              <a14:hiddenFill xmlns="" xmlns:a14="http://schemas.microsoft.com/office/drawing/2010/main">
                 <a:solidFill>
                   <a:srgbClr val="FFFFFF"/>
                 </a:solidFill>
               </a14:hiddenFill>
             </a:ext>
             <a:ext uri="{91240B29-F687-4f45-9708-019B960494DF}">
-              <a14:hiddenLine xmlns:a14="http://schemas.microsoft.com/office/drawing/2010/main" xmlns="" w="9525">
+              <a14:hiddenLine xmlns="" xmlns:a14="http://schemas.microsoft.com/office/drawing/2010/main" w="9525">
                 <a:solidFill>
                   <a:srgbClr val="000000"/>
                 </a:solidFill>
@@ -41447,14 +42417,14 @@
           </a:ln>
           <a:extLst>
             <a:ext uri="{909E8E84-426E-40dd-AFC4-6F175D3DCCD1}">
-              <a14:hiddenFill xmlns:a14="http://schemas.microsoft.com/office/drawing/2010/main" xmlns="">
+              <a14:hiddenFill xmlns="" xmlns:a14="http://schemas.microsoft.com/office/drawing/2010/main">
                 <a:solidFill>
                   <a:srgbClr val="FFFFFF"/>
                 </a:solidFill>
               </a14:hiddenFill>
             </a:ext>
             <a:ext uri="{91240B29-F687-4f45-9708-019B960494DF}">
-              <a14:hiddenLine xmlns:a14="http://schemas.microsoft.com/office/drawing/2010/main" xmlns="" w="9525">
+              <a14:hiddenLine xmlns="" xmlns:a14="http://schemas.microsoft.com/office/drawing/2010/main" w="9525">
                 <a:solidFill>
                   <a:srgbClr val="000000"/>
                 </a:solidFill>
@@ -41618,14 +42588,14 @@
           </a:ln>
           <a:extLst>
             <a:ext uri="{909E8E84-426E-40dd-AFC4-6F175D3DCCD1}">
-              <a14:hiddenFill xmlns:a14="http://schemas.microsoft.com/office/drawing/2010/main" xmlns="">
+              <a14:hiddenFill xmlns="" xmlns:a14="http://schemas.microsoft.com/office/drawing/2010/main">
                 <a:solidFill>
                   <a:srgbClr val="FFFFFF"/>
                 </a:solidFill>
               </a14:hiddenFill>
             </a:ext>
             <a:ext uri="{91240B29-F687-4f45-9708-019B960494DF}">
-              <a14:hiddenLine xmlns:a14="http://schemas.microsoft.com/office/drawing/2010/main" xmlns="" w="9525">
+              <a14:hiddenLine xmlns="" xmlns:a14="http://schemas.microsoft.com/office/drawing/2010/main" w="9525">
                 <a:solidFill>
                   <a:srgbClr val="000000"/>
                 </a:solidFill>
@@ -41810,7 +42780,7 @@
             </a:ln>
             <a:extLst>
               <a:ext uri="{909E8E84-426E-40dd-AFC4-6F175D3DCCD1}">
-                <a14:hiddenFill xmlns:a14="http://schemas.microsoft.com/office/drawing/2010/main" xmlns="">
+                <a14:hiddenFill xmlns="" xmlns:a14="http://schemas.microsoft.com/office/drawing/2010/main">
                   <a:noFill/>
                 </a14:hiddenFill>
               </a:ext>
@@ -41846,14 +42816,14 @@
             </a:ln>
             <a:extLst>
               <a:ext uri="{909E8E84-426E-40dd-AFC4-6F175D3DCCD1}">
-                <a14:hiddenFill xmlns:a14="http://schemas.microsoft.com/office/drawing/2010/main" xmlns="">
+                <a14:hiddenFill xmlns="" xmlns:a14="http://schemas.microsoft.com/office/drawing/2010/main">
                   <a:solidFill>
                     <a:srgbClr val="FFFFFF"/>
                   </a:solidFill>
                 </a14:hiddenFill>
               </a:ext>
               <a:ext uri="{91240B29-F687-4f45-9708-019B960494DF}">
-                <a14:hiddenLine xmlns:a14="http://schemas.microsoft.com/office/drawing/2010/main" xmlns="" w="9525">
+                <a14:hiddenLine xmlns="" xmlns:a14="http://schemas.microsoft.com/office/drawing/2010/main" w="9525">
                   <a:solidFill>
                     <a:srgbClr val="000000"/>
                   </a:solidFill>
@@ -42023,7 +42993,7 @@
           </a:ln>
           <a:extLst>
             <a:ext uri="{909E8E84-426E-40dd-AFC4-6F175D3DCCD1}">
-              <a14:hiddenFill xmlns:a14="http://schemas.microsoft.com/office/drawing/2010/main" xmlns="">
+              <a14:hiddenFill xmlns="" xmlns:a14="http://schemas.microsoft.com/office/drawing/2010/main">
                 <a:noFill/>
               </a14:hiddenFill>
             </a:ext>
@@ -42064,7 +43034,7 @@
           </a:ln>
           <a:extLst>
             <a:ext uri="{909E8E84-426E-40dd-AFC4-6F175D3DCCD1}">
-              <a14:hiddenFill xmlns:a14="http://schemas.microsoft.com/office/drawing/2010/main" xmlns="">
+              <a14:hiddenFill xmlns="" xmlns:a14="http://schemas.microsoft.com/office/drawing/2010/main">
                 <a:noFill/>
               </a14:hiddenFill>
             </a:ext>
@@ -42105,7 +43075,7 @@
           </a:ln>
           <a:extLst>
             <a:ext uri="{909E8E84-426E-40dd-AFC4-6F175D3DCCD1}">
-              <a14:hiddenFill xmlns:a14="http://schemas.microsoft.com/office/drawing/2010/main" xmlns="">
+              <a14:hiddenFill xmlns="" xmlns:a14="http://schemas.microsoft.com/office/drawing/2010/main">
                 <a:noFill/>
               </a14:hiddenFill>
             </a:ext>
@@ -42141,14 +43111,14 @@
           </a:ln>
           <a:extLst>
             <a:ext uri="{909E8E84-426E-40dd-AFC4-6F175D3DCCD1}">
-              <a14:hiddenFill xmlns:a14="http://schemas.microsoft.com/office/drawing/2010/main" xmlns="">
+              <a14:hiddenFill xmlns="" xmlns:a14="http://schemas.microsoft.com/office/drawing/2010/main">
                 <a:solidFill>
                   <a:srgbClr val="FFFFFF"/>
                 </a:solidFill>
               </a14:hiddenFill>
             </a:ext>
             <a:ext uri="{91240B29-F687-4f45-9708-019B960494DF}">
-              <a14:hiddenLine xmlns:a14="http://schemas.microsoft.com/office/drawing/2010/main" xmlns="" w="9525">
+              <a14:hiddenLine xmlns="" xmlns:a14="http://schemas.microsoft.com/office/drawing/2010/main" w="9525">
                 <a:solidFill>
                   <a:srgbClr val="000000"/>
                 </a:solidFill>
@@ -42317,7 +43287,7 @@
           </a:ln>
           <a:extLst>
             <a:ext uri="{909E8E84-426E-40dd-AFC4-6F175D3DCCD1}">
-              <a14:hiddenFill xmlns:a14="http://schemas.microsoft.com/office/drawing/2010/main" xmlns="">
+              <a14:hiddenFill xmlns="" xmlns:a14="http://schemas.microsoft.com/office/drawing/2010/main">
                 <a:noFill/>
               </a14:hiddenFill>
             </a:ext>
@@ -42353,14 +43323,14 @@
           </a:ln>
           <a:extLst>
             <a:ext uri="{909E8E84-426E-40dd-AFC4-6F175D3DCCD1}">
-              <a14:hiddenFill xmlns:a14="http://schemas.microsoft.com/office/drawing/2010/main" xmlns="">
+              <a14:hiddenFill xmlns="" xmlns:a14="http://schemas.microsoft.com/office/drawing/2010/main">
                 <a:solidFill>
                   <a:srgbClr val="FFFFFF"/>
                 </a:solidFill>
               </a14:hiddenFill>
             </a:ext>
             <a:ext uri="{91240B29-F687-4f45-9708-019B960494DF}">
-              <a14:hiddenLine xmlns:a14="http://schemas.microsoft.com/office/drawing/2010/main" xmlns="" w="9525">
+              <a14:hiddenLine xmlns="" xmlns:a14="http://schemas.microsoft.com/office/drawing/2010/main" w="9525">
                 <a:solidFill>
                   <a:srgbClr val="000000"/>
                 </a:solidFill>
@@ -42527,14 +43497,14 @@
           </a:ln>
           <a:extLst>
             <a:ext uri="{909E8E84-426E-40dd-AFC4-6F175D3DCCD1}">
-              <a14:hiddenFill xmlns:a14="http://schemas.microsoft.com/office/drawing/2010/main" xmlns="">
+              <a14:hiddenFill xmlns="" xmlns:a14="http://schemas.microsoft.com/office/drawing/2010/main">
                 <a:solidFill>
                   <a:srgbClr val="FFFFFF"/>
                 </a:solidFill>
               </a14:hiddenFill>
             </a:ext>
             <a:ext uri="{91240B29-F687-4f45-9708-019B960494DF}">
-              <a14:hiddenLine xmlns:a14="http://schemas.microsoft.com/office/drawing/2010/main" xmlns="" w="9525">
+              <a14:hiddenLine xmlns="" xmlns:a14="http://schemas.microsoft.com/office/drawing/2010/main" w="9525">
                 <a:solidFill>
                   <a:srgbClr val="000000"/>
                 </a:solidFill>
@@ -42698,14 +43668,14 @@
           </a:ln>
           <a:extLst>
             <a:ext uri="{909E8E84-426E-40dd-AFC4-6F175D3DCCD1}">
-              <a14:hiddenFill xmlns:a14="http://schemas.microsoft.com/office/drawing/2010/main" xmlns="">
+              <a14:hiddenFill xmlns="" xmlns:a14="http://schemas.microsoft.com/office/drawing/2010/main">
                 <a:solidFill>
                   <a:srgbClr val="FFFFFF"/>
                 </a:solidFill>
               </a14:hiddenFill>
             </a:ext>
             <a:ext uri="{91240B29-F687-4f45-9708-019B960494DF}">
-              <a14:hiddenLine xmlns:a14="http://schemas.microsoft.com/office/drawing/2010/main" xmlns="" w="9525">
+              <a14:hiddenLine xmlns="" xmlns:a14="http://schemas.microsoft.com/office/drawing/2010/main" w="9525">
                 <a:solidFill>
                   <a:srgbClr val="000000"/>
                 </a:solidFill>

</xml_diff>